<commit_message>
modified tamplate for presentation (added)
</commit_message>
<xml_diff>
--- a/Presentation/presentation.pptx
+++ b/Presentation/presentation.pptx
@@ -5,27 +5,24 @@
     <p:sldMasterId id="2147483660" r:id="rId1"/>
   </p:sldMasterIdLst>
   <p:notesMasterIdLst>
-    <p:notesMasterId r:id="rId12"/>
+    <p:notesMasterId r:id="rId9"/>
   </p:notesMasterIdLst>
   <p:handoutMasterIdLst>
-    <p:handoutMasterId r:id="rId13"/>
+    <p:handoutMasterId r:id="rId10"/>
   </p:handoutMasterIdLst>
   <p:sldIdLst>
     <p:sldId id="256" r:id="rId2"/>
     <p:sldId id="257" r:id="rId3"/>
     <p:sldId id="258" r:id="rId4"/>
-    <p:sldId id="259" r:id="rId5"/>
-    <p:sldId id="260" r:id="rId6"/>
-    <p:sldId id="261" r:id="rId7"/>
-    <p:sldId id="262" r:id="rId8"/>
-    <p:sldId id="263" r:id="rId9"/>
-    <p:sldId id="264" r:id="rId10"/>
-    <p:sldId id="265" r:id="rId11"/>
+    <p:sldId id="263" r:id="rId5"/>
+    <p:sldId id="264" r:id="rId6"/>
+    <p:sldId id="265" r:id="rId7"/>
+    <p:sldId id="260" r:id="rId8"/>
   </p:sldIdLst>
   <p:sldSz cx="9144000" cy="6858000" type="screen4x3"/>
   <p:notesSz cx="7099300" cy="10234613"/>
   <p:custDataLst>
-    <p:tags r:id="rId14"/>
+    <p:tags r:id="rId11"/>
   </p:custDataLst>
   <p:kinsoku lang="ja-JP" invalStChars="、。，．・：；？！゛゜ヽヾゝゞ々ー’”）〕］｝〉》」』】°‰′″℃￠％ぁぃぅぇぉっゃゅょゎァィゥェォッャュョヮヵヶ!%),.:;?]}｡｣､･ｧｨｩｪｫｬｭｮｯｰﾞﾟ" invalEndChars="‘“（〔［｛〈《「『【￥＄$([\{｢￡"/>
   <p:defaultTextStyle>
@@ -222,7 +219,7 @@
               <a:pPr algn="r" defTabSz="963613" eaLnBrk="0" hangingPunct="0">
                 <a:defRPr/>
               </a:pPr>
-              <a:t>‹#›</a:t>
+              <a:t>‹Nr.›</a:t>
             </a:fld>
             <a:endParaRPr lang="en-US" sz="1500">
               <a:latin typeface="Times New Roman" pitchFamily="18" charset="0"/>
@@ -407,7 +404,7 @@
               <a:pPr algn="r" defTabSz="963613" eaLnBrk="0" hangingPunct="0">
                 <a:defRPr/>
               </a:pPr>
-              <a:t>‹#›</a:t>
+              <a:t>‹Nr.›</a:t>
             </a:fld>
             <a:endParaRPr lang="en-US" sz="1500">
               <a:latin typeface="Times New Roman" pitchFamily="18" charset="0"/>
@@ -12138,7 +12135,7 @@
             </a:pPr>
             <a:fld id="{63707275-EA33-4C2C-A96C-B80BEB93EE54}" type="slidenum">
               <a:rPr lang="de-AT" smtClean="0"/>
-              <a:t>‹#›</a:t>
+              <a:t>‹Nr.›</a:t>
             </a:fld>
             <a:endParaRPr lang="de-AT" dirty="0"/>
           </a:p>
@@ -12274,7 +12271,7 @@
             </a:pPr>
             <a:fld id="{63707275-EA33-4C2C-A96C-B80BEB93EE54}" type="slidenum">
               <a:rPr lang="de-AT" smtClean="0"/>
-              <a:t>‹#›</a:t>
+              <a:t>‹Nr.›</a:t>
             </a:fld>
             <a:endParaRPr lang="de-AT" dirty="0"/>
           </a:p>
@@ -12506,7 +12503,7 @@
             </a:pPr>
             <a:fld id="{63707275-EA33-4C2C-A96C-B80BEB93EE54}" type="slidenum">
               <a:rPr lang="de-AT" smtClean="0"/>
-              <a:t>‹#›</a:t>
+              <a:t>‹Nr.›</a:t>
             </a:fld>
             <a:endParaRPr lang="de-AT" dirty="0"/>
           </a:p>
@@ -12727,7 +12724,7 @@
             </a:pPr>
             <a:fld id="{63707275-EA33-4C2C-A96C-B80BEB93EE54}" type="slidenum">
               <a:rPr lang="de-AT" smtClean="0"/>
-              <a:t>‹#›</a:t>
+              <a:t>‹Nr.›</a:t>
             </a:fld>
             <a:endParaRPr lang="de-AT" dirty="0"/>
           </a:p>
@@ -12890,7 +12887,7 @@
             </a:pPr>
             <a:fld id="{63707275-EA33-4C2C-A96C-B80BEB93EE54}" type="slidenum">
               <a:rPr lang="de-AT" smtClean="0"/>
-              <a:t>‹#›</a:t>
+              <a:t>‹Nr.›</a:t>
             </a:fld>
             <a:endParaRPr lang="de-AT" dirty="0"/>
           </a:p>
@@ -13077,7 +13074,7 @@
             </a:pPr>
             <a:fld id="{63707275-EA33-4C2C-A96C-B80BEB93EE54}" type="slidenum">
               <a:rPr lang="de-AT" smtClean="0"/>
-              <a:t>‹#›</a:t>
+              <a:t>‹Nr.›</a:t>
             </a:fld>
             <a:endParaRPr lang="de-AT" dirty="0"/>
           </a:p>
@@ -13360,7 +13357,7 @@
             </a:pPr>
             <a:fld id="{63707275-EA33-4C2C-A96C-B80BEB93EE54}" type="slidenum">
               <a:rPr lang="de-AT" smtClean="0"/>
-              <a:t>‹#›</a:t>
+              <a:t>‹Nr.›</a:t>
             </a:fld>
             <a:endParaRPr lang="de-AT" dirty="0"/>
           </a:p>
@@ -13473,7 +13470,7 @@
             </a:pPr>
             <a:fld id="{63707275-EA33-4C2C-A96C-B80BEB93EE54}" type="slidenum">
               <a:rPr lang="de-AT" smtClean="0"/>
-              <a:t>‹#›</a:t>
+              <a:t>‹Nr.›</a:t>
             </a:fld>
             <a:endParaRPr lang="de-AT" dirty="0"/>
           </a:p>
@@ -13563,7 +13560,7 @@
             </a:pPr>
             <a:fld id="{63707275-EA33-4C2C-A96C-B80BEB93EE54}" type="slidenum">
               <a:rPr lang="de-AT" smtClean="0"/>
-              <a:t>‹#›</a:t>
+              <a:t>‹Nr.›</a:t>
             </a:fld>
             <a:endParaRPr lang="de-AT" dirty="0"/>
           </a:p>
@@ -13828,7 +13825,7 @@
             </a:pPr>
             <a:fld id="{63707275-EA33-4C2C-A96C-B80BEB93EE54}" type="slidenum">
               <a:rPr lang="de-AT" smtClean="0"/>
-              <a:t>‹#›</a:t>
+              <a:t>‹Nr.›</a:t>
             </a:fld>
             <a:endParaRPr lang="de-AT" dirty="0"/>
           </a:p>
@@ -14070,7 +14067,7 @@
             </a:pPr>
             <a:fld id="{63707275-EA33-4C2C-A96C-B80BEB93EE54}" type="slidenum">
               <a:rPr lang="de-AT" smtClean="0"/>
-              <a:t>‹#›</a:t>
+              <a:t>‹Nr.›</a:t>
             </a:fld>
             <a:endParaRPr lang="de-AT" dirty="0"/>
           </a:p>
@@ -14228,7 +14225,7 @@
             </a:pPr>
             <a:fld id="{63707275-EA33-4C2C-A96C-B80BEB93EE54}" type="slidenum">
               <a:rPr lang="de-AT" smtClean="0"/>
-              <a:t>‹#›</a:t>
+              <a:t>‹Nr.›</a:t>
             </a:fld>
             <a:endParaRPr lang="de-AT" dirty="0"/>
           </a:p>
@@ -18849,7 +18846,7 @@
             </a:pPr>
             <a:fld id="{63707275-EA33-4C2C-A96C-B80BEB93EE54}" type="slidenum">
               <a:rPr lang="de-AT" smtClean="0"/>
-              <a:t>‹#›</a:t>
+              <a:t>‹Nr.›</a:t>
             </a:fld>
             <a:endParaRPr lang="de-AT" dirty="0"/>
           </a:p>
@@ -19483,15 +19480,7 @@
             <a:pPr eaLnBrk="1" hangingPunct="1"/>
             <a:r>
               <a:rPr lang="en-US" dirty="0" smtClean="0"/>
-              <a:t>Choose </a:t>
-            </a:r>
-            <a:r>
-              <a:rPr lang="en-US" dirty="0" smtClean="0"/>
-              <a:t>„Insert </a:t>
-            </a:r>
-            <a:r>
-              <a:rPr lang="en-US" dirty="0" smtClean="0"/>
-              <a:t>/ Header and Footer...“ and edit the footer to display </a:t>
+              <a:t>Choose „Insert / Header and Footer...“ and edit the footer to display </a:t>
             </a:r>
             <a:r>
               <a:rPr lang="en-US" dirty="0" smtClean="0">
@@ -19865,8 +19854,8 @@
               <a:defRPr/>
             </a:pPr>
             <a:r>
-              <a:rPr lang="de-AT" smtClean="0"/>
-              <a:t>&lt;insert your name here&gt;</a:t>
+              <a:rPr lang="de-AT" dirty="0"/>
+              <a:t>Bernhard Rainer, Silvester Farda</a:t>
             </a:r>
             <a:endParaRPr lang="de-AT" dirty="0"/>
           </a:p>
@@ -19876,169 +19865,6 @@
     <p:extLst>
       <p:ext uri="{BB962C8B-B14F-4D97-AF65-F5344CB8AC3E}">
         <p14:creationId xmlns:p14="http://schemas.microsoft.com/office/powerpoint/2010/main" val="2177755775"/>
-      </p:ext>
-    </p:extLst>
-  </p:cSld>
-  <p:clrMapOvr>
-    <a:masterClrMapping/>
-  </p:clrMapOvr>
-  <p:timing>
-    <p:tnLst>
-      <p:par>
-        <p:cTn id="1" dur="indefinite" restart="never" nodeType="tmRoot"/>
-      </p:par>
-    </p:tnLst>
-  </p:timing>
-</p:sld>
-</file>
-
-<file path=ppt/slides/slide10.xml><?xml version="1.0" encoding="utf-8"?>
-<p:sld xmlns:a="http://schemas.openxmlformats.org/drawingml/2006/main" xmlns:r="http://schemas.openxmlformats.org/officeDocument/2006/relationships" xmlns:p="http://schemas.openxmlformats.org/presentationml/2006/main">
-  <p:cSld>
-    <p:spTree>
-      <p:nvGrpSpPr>
-        <p:cNvPr id="1" name=""/>
-        <p:cNvGrpSpPr/>
-        <p:nvPr/>
-      </p:nvGrpSpPr>
-      <p:grpSpPr>
-        <a:xfrm>
-          <a:off x="0" y="0"/>
-          <a:ext cx="0" cy="0"/>
-          <a:chOff x="0" y="0"/>
-          <a:chExt cx="0" cy="0"/>
-        </a:xfrm>
-      </p:grpSpPr>
-      <p:sp>
-        <p:nvSpPr>
-          <p:cNvPr id="12292" name="Rectangle 2"/>
-          <p:cNvSpPr>
-            <a:spLocks noGrp="1" noChangeArrowheads="1"/>
-          </p:cNvSpPr>
-          <p:nvPr>
-            <p:ph type="title"/>
-          </p:nvPr>
-        </p:nvSpPr>
-        <p:spPr/>
-        <p:txBody>
-          <a:bodyPr/>
-          <a:lstStyle/>
-          <a:p>
-            <a:pPr eaLnBrk="1" hangingPunct="1"/>
-            <a:r>
-              <a:rPr lang="en-US" smtClean="0"/>
-              <a:t>Conclusions</a:t>
-            </a:r>
-          </a:p>
-        </p:txBody>
-      </p:sp>
-      <p:sp>
-        <p:nvSpPr>
-          <p:cNvPr id="12293" name="Rectangle 3"/>
-          <p:cNvSpPr>
-            <a:spLocks noGrp="1" noChangeArrowheads="1"/>
-          </p:cNvSpPr>
-          <p:nvPr>
-            <p:ph type="body" idx="1"/>
-          </p:nvPr>
-        </p:nvSpPr>
-        <p:spPr/>
-        <p:txBody>
-          <a:bodyPr/>
-          <a:lstStyle/>
-          <a:p>
-            <a:pPr eaLnBrk="1" hangingPunct="1"/>
-            <a:r>
-              <a:rPr lang="en-US" smtClean="0"/>
-              <a:t>The quick brown fox jumps over the lazy dog</a:t>
-            </a:r>
-          </a:p>
-          <a:p>
-            <a:pPr eaLnBrk="1" hangingPunct="1"/>
-            <a:r>
-              <a:rPr lang="en-US" smtClean="0"/>
-              <a:t>The quick brown master jumps over the lazy dog</a:t>
-            </a:r>
-          </a:p>
-          <a:p>
-            <a:pPr eaLnBrk="1" hangingPunct="1"/>
-            <a:r>
-              <a:rPr lang="en-US" smtClean="0"/>
-              <a:t>The quick brown fox jumps over the lazy dog</a:t>
-            </a:r>
-          </a:p>
-          <a:p>
-            <a:pPr eaLnBrk="1" hangingPunct="1"/>
-            <a:r>
-              <a:rPr lang="en-US" smtClean="0"/>
-              <a:t>The quick brown master jumps over the lazy dog</a:t>
-            </a:r>
-          </a:p>
-          <a:p>
-            <a:pPr eaLnBrk="1" hangingPunct="1"/>
-            <a:r>
-              <a:rPr lang="en-US" smtClean="0"/>
-              <a:t>The quick brown fox jumps over the lazy dog</a:t>
-            </a:r>
-          </a:p>
-        </p:txBody>
-      </p:sp>
-      <p:sp>
-        <p:nvSpPr>
-          <p:cNvPr id="5" name="Slide Number Placeholder 4"/>
-          <p:cNvSpPr>
-            <a:spLocks noGrp="1"/>
-          </p:cNvSpPr>
-          <p:nvPr>
-            <p:ph type="sldNum" sz="quarter" idx="11"/>
-          </p:nvPr>
-        </p:nvSpPr>
-        <p:spPr/>
-        <p:txBody>
-          <a:bodyPr/>
-          <a:lstStyle/>
-          <a:p>
-            <a:pPr>
-              <a:defRPr/>
-            </a:pPr>
-            <a:fld id="{63707275-EA33-4C2C-A96C-B80BEB93EE54}" type="slidenum">
-              <a:rPr lang="de-AT" smtClean="0"/>
-              <a:t>10</a:t>
-            </a:fld>
-            <a:endParaRPr lang="de-AT" dirty="0"/>
-          </a:p>
-        </p:txBody>
-      </p:sp>
-      <p:sp>
-        <p:nvSpPr>
-          <p:cNvPr id="6" name="Footer Placeholder 5"/>
-          <p:cNvSpPr>
-            <a:spLocks noGrp="1"/>
-          </p:cNvSpPr>
-          <p:nvPr>
-            <p:ph type="ftr" sz="quarter" idx="10"/>
-          </p:nvPr>
-        </p:nvSpPr>
-        <p:spPr/>
-        <p:txBody>
-          <a:bodyPr/>
-          <a:lstStyle/>
-          <a:p>
-            <a:pPr>
-              <a:defRPr/>
-            </a:pPr>
-            <a:r>
-              <a:rPr lang="de-AT" smtClean="0"/>
-              <a:t>&lt;insert your name here&gt;</a:t>
-            </a:r>
-            <a:endParaRPr lang="de-AT" dirty="0"/>
-          </a:p>
-        </p:txBody>
-      </p:sp>
-    </p:spTree>
-    <p:extLst>
-      <p:ext uri="{BB962C8B-B14F-4D97-AF65-F5344CB8AC3E}">
-        <p14:creationId xmlns:p14="http://schemas.microsoft.com/office/powerpoint/2010/main" val="1565256185"/>
       </p:ext>
     </p:extLst>
   </p:cSld>
@@ -20468,8 +20294,8 @@
               <a:defRPr/>
             </a:pPr>
             <a:r>
-              <a:rPr lang="de-AT" smtClean="0"/>
-              <a:t>&lt;insert your name here&gt;</a:t>
+              <a:rPr lang="de-AT" dirty="0"/>
+              <a:t>Bernhard Rainer, Silvester Farda</a:t>
             </a:r>
             <a:endParaRPr lang="de-AT" dirty="0"/>
           </a:p>
@@ -20558,11 +20384,7 @@
             <a:pPr eaLnBrk="1" hangingPunct="1"/>
             <a:r>
               <a:rPr lang="en-US" sz="2800" dirty="0" smtClean="0"/>
-              <a:t>An alternate color scheme for dark background slides is provided – use it only if it’s </a:t>
-            </a:r>
-            <a:r>
-              <a:rPr lang="en-US" sz="2800" dirty="0" smtClean="0"/>
-              <a:t>unavoidable</a:t>
+              <a:t>An alternate color scheme for dark background slides is provided – use it only if it’s unavoidable</a:t>
             </a:r>
           </a:p>
           <a:p>
@@ -20609,7 +20431,6 @@
               <a:rPr lang="en-US" sz="2800" dirty="0" smtClean="0"/>
               <a:t>Option 2: just select the rightmost Background Style (some colors might not adapt correctly)</a:t>
             </a:r>
-            <a:endParaRPr lang="en-US" sz="2800" dirty="0" smtClean="0"/>
           </a:p>
         </p:txBody>
       </p:sp>
@@ -20963,8 +20784,8 @@
               <a:defRPr/>
             </a:pPr>
             <a:r>
-              <a:rPr lang="de-AT" smtClean="0"/>
-              <a:t>&lt;insert your name here&gt;</a:t>
+              <a:rPr lang="de-AT" dirty="0"/>
+              <a:t>Bernhard Rainer, Silvester Farda</a:t>
             </a:r>
             <a:endParaRPr lang="de-AT" dirty="0"/>
           </a:p>
@@ -20991,2363 +20812,6 @@
 </file>
 
 <file path=ppt/slides/slide4.xml><?xml version="1.0" encoding="utf-8"?>
-<p:sld xmlns:a="http://schemas.openxmlformats.org/drawingml/2006/main" xmlns:r="http://schemas.openxmlformats.org/officeDocument/2006/relationships" xmlns:p="http://schemas.openxmlformats.org/presentationml/2006/main">
-  <p:cSld>
-    <p:spTree>
-      <p:nvGrpSpPr>
-        <p:cNvPr id="1" name=""/>
-        <p:cNvGrpSpPr/>
-        <p:nvPr/>
-      </p:nvGrpSpPr>
-      <p:grpSpPr>
-        <a:xfrm>
-          <a:off x="0" y="0"/>
-          <a:ext cx="0" cy="0"/>
-          <a:chOff x="0" y="0"/>
-          <a:chExt cx="0" cy="0"/>
-        </a:xfrm>
-      </p:grpSpPr>
-      <p:sp>
-        <p:nvSpPr>
-          <p:cNvPr id="6146" name="Rectangle 2"/>
-          <p:cNvSpPr>
-            <a:spLocks noGrp="1" noChangeArrowheads="1"/>
-          </p:cNvSpPr>
-          <p:nvPr>
-            <p:ph type="ctrTitle"/>
-          </p:nvPr>
-        </p:nvSpPr>
-        <p:spPr/>
-        <p:txBody>
-          <a:bodyPr/>
-          <a:lstStyle/>
-          <a:p>
-            <a:pPr eaLnBrk="1" hangingPunct="1"/>
-            <a:r>
-              <a:rPr lang="en-US" smtClean="0"/>
-              <a:t>&lt;insert presentation title here&gt;</a:t>
-            </a:r>
-          </a:p>
-        </p:txBody>
-      </p:sp>
-      <p:sp>
-        <p:nvSpPr>
-          <p:cNvPr id="6147" name="Rectangle 3"/>
-          <p:cNvSpPr>
-            <a:spLocks noGrp="1" noChangeArrowheads="1"/>
-          </p:cNvSpPr>
-          <p:nvPr>
-            <p:ph type="subTitle" idx="1"/>
-          </p:nvPr>
-        </p:nvSpPr>
-        <p:spPr/>
-        <p:txBody>
-          <a:bodyPr/>
-          <a:lstStyle/>
-          <a:p>
-            <a:pPr eaLnBrk="1" hangingPunct="1"/>
-            <a:r>
-              <a:rPr lang="en-US" smtClean="0"/>
-              <a:t>&lt;insert author names here&gt;</a:t>
-            </a:r>
-          </a:p>
-        </p:txBody>
-      </p:sp>
-      <p:sp>
-        <p:nvSpPr>
-          <p:cNvPr id="6148" name="Text Box 4"/>
-          <p:cNvSpPr txBox="1">
-            <a:spLocks noChangeArrowheads="1"/>
-          </p:cNvSpPr>
-          <p:nvPr/>
-        </p:nvSpPr>
-        <p:spPr bwMode="auto">
-          <a:xfrm>
-            <a:off x="179388" y="4652963"/>
-            <a:ext cx="8424862" cy="1160462"/>
-          </a:xfrm>
-          <a:prstGeom prst="rect">
-            <a:avLst/>
-          </a:prstGeom>
-          <a:noFill/>
-          <a:ln>
-            <a:noFill/>
-          </a:ln>
-          <a:extLst>
-            <a:ext uri="{909E8E84-426E-40DD-AFC4-6F175D3DCCD1}">
-              <a14:hiddenFill xmlns:a14="http://schemas.microsoft.com/office/drawing/2010/main">
-                <a:solidFill>
-                  <a:srgbClr val="FFFFFF"/>
-                </a:solidFill>
-              </a14:hiddenFill>
-            </a:ext>
-            <a:ext uri="{91240B29-F687-4F45-9708-019B960494DF}">
-              <a14:hiddenLine xmlns:a14="http://schemas.microsoft.com/office/drawing/2010/main" w="9525">
-                <a:solidFill>
-                  <a:srgbClr val="000000"/>
-                </a:solidFill>
-                <a:miter lim="800000"/>
-                <a:headEnd/>
-                <a:tailEnd/>
-              </a14:hiddenLine>
-            </a:ext>
-          </a:extLst>
-        </p:spPr>
-        <p:txBody>
-          <a:bodyPr>
-            <a:spAutoFit/>
-          </a:bodyPr>
-          <a:lstStyle>
-            <a:lvl1pPr eaLnBrk="0" hangingPunct="0">
-              <a:defRPr>
-                <a:solidFill>
-                  <a:schemeClr val="tx1"/>
-                </a:solidFill>
-                <a:latin typeface="Arial" charset="0"/>
-              </a:defRPr>
-            </a:lvl1pPr>
-            <a:lvl2pPr marL="742950" indent="-285750" eaLnBrk="0" hangingPunct="0">
-              <a:defRPr>
-                <a:solidFill>
-                  <a:schemeClr val="tx1"/>
-                </a:solidFill>
-                <a:latin typeface="Arial" charset="0"/>
-              </a:defRPr>
-            </a:lvl2pPr>
-            <a:lvl3pPr marL="1143000" indent="-228600" eaLnBrk="0" hangingPunct="0">
-              <a:defRPr>
-                <a:solidFill>
-                  <a:schemeClr val="tx1"/>
-                </a:solidFill>
-                <a:latin typeface="Arial" charset="0"/>
-              </a:defRPr>
-            </a:lvl3pPr>
-            <a:lvl4pPr marL="1600200" indent="-228600" eaLnBrk="0" hangingPunct="0">
-              <a:defRPr>
-                <a:solidFill>
-                  <a:schemeClr val="tx1"/>
-                </a:solidFill>
-                <a:latin typeface="Arial" charset="0"/>
-              </a:defRPr>
-            </a:lvl4pPr>
-            <a:lvl5pPr marL="2057400" indent="-228600" eaLnBrk="0" hangingPunct="0">
-              <a:defRPr>
-                <a:solidFill>
-                  <a:schemeClr val="tx1"/>
-                </a:solidFill>
-                <a:latin typeface="Arial" charset="0"/>
-              </a:defRPr>
-            </a:lvl5pPr>
-            <a:lvl6pPr marL="2514600" indent="-228600" eaLnBrk="0" fontAlgn="base" hangingPunct="0">
-              <a:spcBef>
-                <a:spcPct val="0"/>
-              </a:spcBef>
-              <a:spcAft>
-                <a:spcPct val="0"/>
-              </a:spcAft>
-              <a:defRPr>
-                <a:solidFill>
-                  <a:schemeClr val="tx1"/>
-                </a:solidFill>
-                <a:latin typeface="Arial" charset="0"/>
-              </a:defRPr>
-            </a:lvl6pPr>
-            <a:lvl7pPr marL="2971800" indent="-228600" eaLnBrk="0" fontAlgn="base" hangingPunct="0">
-              <a:spcBef>
-                <a:spcPct val="0"/>
-              </a:spcBef>
-              <a:spcAft>
-                <a:spcPct val="0"/>
-              </a:spcAft>
-              <a:defRPr>
-                <a:solidFill>
-                  <a:schemeClr val="tx1"/>
-                </a:solidFill>
-                <a:latin typeface="Arial" charset="0"/>
-              </a:defRPr>
-            </a:lvl7pPr>
-            <a:lvl8pPr marL="3429000" indent="-228600" eaLnBrk="0" fontAlgn="base" hangingPunct="0">
-              <a:spcBef>
-                <a:spcPct val="0"/>
-              </a:spcBef>
-              <a:spcAft>
-                <a:spcPct val="0"/>
-              </a:spcAft>
-              <a:defRPr>
-                <a:solidFill>
-                  <a:schemeClr val="tx1"/>
-                </a:solidFill>
-                <a:latin typeface="Arial" charset="0"/>
-              </a:defRPr>
-            </a:lvl8pPr>
-            <a:lvl9pPr marL="3886200" indent="-228600" eaLnBrk="0" fontAlgn="base" hangingPunct="0">
-              <a:spcBef>
-                <a:spcPct val="0"/>
-              </a:spcBef>
-              <a:spcAft>
-                <a:spcPct val="0"/>
-              </a:spcAft>
-              <a:defRPr>
-                <a:solidFill>
-                  <a:schemeClr val="tx1"/>
-                </a:solidFill>
-                <a:latin typeface="Arial" charset="0"/>
-              </a:defRPr>
-            </a:lvl9pPr>
-          </a:lstStyle>
-          <a:p>
-            <a:pPr algn="ctr" eaLnBrk="1" hangingPunct="1">
-              <a:spcBef>
-                <a:spcPct val="50000"/>
-              </a:spcBef>
-            </a:pPr>
-            <a:r>
-              <a:rPr lang="en-US" sz="2800">
-                <a:solidFill>
-                  <a:schemeClr val="bg2"/>
-                </a:solidFill>
-              </a:rPr>
-              <a:t>Institute of Computer Graphics and Algorithms</a:t>
-            </a:r>
-          </a:p>
-          <a:p>
-            <a:pPr algn="ctr" eaLnBrk="1" hangingPunct="1">
-              <a:spcBef>
-                <a:spcPct val="50000"/>
-              </a:spcBef>
-            </a:pPr>
-            <a:r>
-              <a:rPr lang="en-US" sz="2800" b="1">
-                <a:solidFill>
-                  <a:schemeClr val="bg2"/>
-                </a:solidFill>
-              </a:rPr>
-              <a:t>Vienna University of Technology</a:t>
-            </a:r>
-          </a:p>
-        </p:txBody>
-      </p:sp>
-    </p:spTree>
-    <p:extLst>
-      <p:ext uri="{BB962C8B-B14F-4D97-AF65-F5344CB8AC3E}">
-        <p14:creationId xmlns:p14="http://schemas.microsoft.com/office/powerpoint/2010/main" val="3670007692"/>
-      </p:ext>
-    </p:extLst>
-  </p:cSld>
-  <p:clrMapOvr>
-    <a:masterClrMapping/>
-  </p:clrMapOvr>
-  <p:timing>
-    <p:tnLst>
-      <p:par>
-        <p:cTn id="1" dur="indefinite" restart="never" nodeType="tmRoot"/>
-      </p:par>
-    </p:tnLst>
-  </p:timing>
-</p:sld>
-</file>
-
-<file path=ppt/slides/slide5.xml><?xml version="1.0" encoding="utf-8"?>
-<p:sld xmlns:a="http://schemas.openxmlformats.org/drawingml/2006/main" xmlns:r="http://schemas.openxmlformats.org/officeDocument/2006/relationships" xmlns:p="http://schemas.openxmlformats.org/presentationml/2006/main">
-  <p:cSld>
-    <p:spTree>
-      <p:nvGrpSpPr>
-        <p:cNvPr id="1" name=""/>
-        <p:cNvGrpSpPr/>
-        <p:nvPr/>
-      </p:nvGrpSpPr>
-      <p:grpSpPr>
-        <a:xfrm>
-          <a:off x="0" y="0"/>
-          <a:ext cx="0" cy="0"/>
-          <a:chOff x="0" y="0"/>
-          <a:chExt cx="0" cy="0"/>
-        </a:xfrm>
-      </p:grpSpPr>
-      <p:sp>
-        <p:nvSpPr>
-          <p:cNvPr id="7170" name="Rectangle 2"/>
-          <p:cNvSpPr>
-            <a:spLocks noGrp="1" noChangeArrowheads="1"/>
-          </p:cNvSpPr>
-          <p:nvPr>
-            <p:ph type="ctrTitle"/>
-          </p:nvPr>
-        </p:nvSpPr>
-        <p:spPr/>
-        <p:txBody>
-          <a:bodyPr/>
-          <a:lstStyle/>
-          <a:p>
-            <a:pPr eaLnBrk="1" hangingPunct="1"/>
-            <a:r>
-              <a:rPr lang="en-US" smtClean="0"/>
-              <a:t>&lt;insert presentation title here&gt;</a:t>
-            </a:r>
-          </a:p>
-        </p:txBody>
-      </p:sp>
-      <p:sp>
-        <p:nvSpPr>
-          <p:cNvPr id="7171" name="Rectangle 3"/>
-          <p:cNvSpPr>
-            <a:spLocks noGrp="1" noChangeArrowheads="1"/>
-          </p:cNvSpPr>
-          <p:nvPr>
-            <p:ph type="subTitle" idx="1"/>
-          </p:nvPr>
-        </p:nvSpPr>
-        <p:spPr/>
-        <p:txBody>
-          <a:bodyPr/>
-          <a:lstStyle/>
-          <a:p>
-            <a:pPr eaLnBrk="1" hangingPunct="1"/>
-            <a:r>
-              <a:rPr lang="en-US" smtClean="0"/>
-              <a:t>&lt;1st author&gt;</a:t>
-            </a:r>
-            <a:r>
-              <a:rPr lang="en-US" baseline="30000" smtClean="0"/>
-              <a:t>1</a:t>
-            </a:r>
-            <a:r>
-              <a:rPr lang="en-US" smtClean="0"/>
-              <a:t> and &lt;2nd author&gt;</a:t>
-            </a:r>
-            <a:r>
-              <a:rPr lang="en-US" baseline="30000" smtClean="0"/>
-              <a:t>2</a:t>
-            </a:r>
-          </a:p>
-        </p:txBody>
-      </p:sp>
-      <p:sp>
-        <p:nvSpPr>
-          <p:cNvPr id="7172" name="Text Box 4"/>
-          <p:cNvSpPr txBox="1">
-            <a:spLocks noChangeArrowheads="1"/>
-          </p:cNvSpPr>
-          <p:nvPr/>
-        </p:nvSpPr>
-        <p:spPr bwMode="auto">
-          <a:xfrm>
-            <a:off x="179388" y="4652963"/>
-            <a:ext cx="4176712" cy="1158875"/>
-          </a:xfrm>
-          <a:prstGeom prst="rect">
-            <a:avLst/>
-          </a:prstGeom>
-          <a:noFill/>
-          <a:ln>
-            <a:noFill/>
-          </a:ln>
-          <a:extLst>
-            <a:ext uri="{909E8E84-426E-40DD-AFC4-6F175D3DCCD1}">
-              <a14:hiddenFill xmlns:a14="http://schemas.microsoft.com/office/drawing/2010/main">
-                <a:solidFill>
-                  <a:srgbClr val="FFFFFF"/>
-                </a:solidFill>
-              </a14:hiddenFill>
-            </a:ext>
-            <a:ext uri="{91240B29-F687-4F45-9708-019B960494DF}">
-              <a14:hiddenLine xmlns:a14="http://schemas.microsoft.com/office/drawing/2010/main" w="9525">
-                <a:solidFill>
-                  <a:srgbClr val="000000"/>
-                </a:solidFill>
-                <a:miter lim="800000"/>
-                <a:headEnd/>
-                <a:tailEnd/>
-              </a14:hiddenLine>
-            </a:ext>
-          </a:extLst>
-        </p:spPr>
-        <p:txBody>
-          <a:bodyPr>
-            <a:spAutoFit/>
-          </a:bodyPr>
-          <a:lstStyle>
-            <a:lvl1pPr eaLnBrk="0" hangingPunct="0">
-              <a:defRPr>
-                <a:solidFill>
-                  <a:schemeClr val="tx1"/>
-                </a:solidFill>
-                <a:latin typeface="Arial" charset="0"/>
-              </a:defRPr>
-            </a:lvl1pPr>
-            <a:lvl2pPr marL="742950" indent="-285750" eaLnBrk="0" hangingPunct="0">
-              <a:defRPr>
-                <a:solidFill>
-                  <a:schemeClr val="tx1"/>
-                </a:solidFill>
-                <a:latin typeface="Arial" charset="0"/>
-              </a:defRPr>
-            </a:lvl2pPr>
-            <a:lvl3pPr marL="1143000" indent="-228600" eaLnBrk="0" hangingPunct="0">
-              <a:defRPr>
-                <a:solidFill>
-                  <a:schemeClr val="tx1"/>
-                </a:solidFill>
-                <a:latin typeface="Arial" charset="0"/>
-              </a:defRPr>
-            </a:lvl3pPr>
-            <a:lvl4pPr marL="1600200" indent="-228600" eaLnBrk="0" hangingPunct="0">
-              <a:defRPr>
-                <a:solidFill>
-                  <a:schemeClr val="tx1"/>
-                </a:solidFill>
-                <a:latin typeface="Arial" charset="0"/>
-              </a:defRPr>
-            </a:lvl4pPr>
-            <a:lvl5pPr marL="2057400" indent="-228600" eaLnBrk="0" hangingPunct="0">
-              <a:defRPr>
-                <a:solidFill>
-                  <a:schemeClr val="tx1"/>
-                </a:solidFill>
-                <a:latin typeface="Arial" charset="0"/>
-              </a:defRPr>
-            </a:lvl5pPr>
-            <a:lvl6pPr marL="2514600" indent="-228600" eaLnBrk="0" fontAlgn="base" hangingPunct="0">
-              <a:spcBef>
-                <a:spcPct val="0"/>
-              </a:spcBef>
-              <a:spcAft>
-                <a:spcPct val="0"/>
-              </a:spcAft>
-              <a:defRPr>
-                <a:solidFill>
-                  <a:schemeClr val="tx1"/>
-                </a:solidFill>
-                <a:latin typeface="Arial" charset="0"/>
-              </a:defRPr>
-            </a:lvl6pPr>
-            <a:lvl7pPr marL="2971800" indent="-228600" eaLnBrk="0" fontAlgn="base" hangingPunct="0">
-              <a:spcBef>
-                <a:spcPct val="0"/>
-              </a:spcBef>
-              <a:spcAft>
-                <a:spcPct val="0"/>
-              </a:spcAft>
-              <a:defRPr>
-                <a:solidFill>
-                  <a:schemeClr val="tx1"/>
-                </a:solidFill>
-                <a:latin typeface="Arial" charset="0"/>
-              </a:defRPr>
-            </a:lvl7pPr>
-            <a:lvl8pPr marL="3429000" indent="-228600" eaLnBrk="0" fontAlgn="base" hangingPunct="0">
-              <a:spcBef>
-                <a:spcPct val="0"/>
-              </a:spcBef>
-              <a:spcAft>
-                <a:spcPct val="0"/>
-              </a:spcAft>
-              <a:defRPr>
-                <a:solidFill>
-                  <a:schemeClr val="tx1"/>
-                </a:solidFill>
-                <a:latin typeface="Arial" charset="0"/>
-              </a:defRPr>
-            </a:lvl8pPr>
-            <a:lvl9pPr marL="3886200" indent="-228600" eaLnBrk="0" fontAlgn="base" hangingPunct="0">
-              <a:spcBef>
-                <a:spcPct val="0"/>
-              </a:spcBef>
-              <a:spcAft>
-                <a:spcPct val="0"/>
-              </a:spcAft>
-              <a:defRPr>
-                <a:solidFill>
-                  <a:schemeClr val="tx1"/>
-                </a:solidFill>
-                <a:latin typeface="Arial" charset="0"/>
-              </a:defRPr>
-            </a:lvl9pPr>
-          </a:lstStyle>
-          <a:p>
-            <a:pPr algn="ctr" eaLnBrk="1" hangingPunct="1">
-              <a:spcBef>
-                <a:spcPct val="50000"/>
-              </a:spcBef>
-            </a:pPr>
-            <a:r>
-              <a:rPr lang="en-US" sz="2000" baseline="30000">
-                <a:solidFill>
-                  <a:schemeClr val="bg2"/>
-                </a:solidFill>
-              </a:rPr>
-              <a:t>1 </a:t>
-            </a:r>
-            <a:r>
-              <a:rPr lang="en-US" sz="2000">
-                <a:solidFill>
-                  <a:schemeClr val="bg2"/>
-                </a:solidFill>
-              </a:rPr>
-              <a:t>Institute of Computer Graphics and Algorithms</a:t>
-            </a:r>
-          </a:p>
-          <a:p>
-            <a:pPr algn="ctr" eaLnBrk="1" hangingPunct="1">
-              <a:spcBef>
-                <a:spcPct val="50000"/>
-              </a:spcBef>
-            </a:pPr>
-            <a:r>
-              <a:rPr lang="en-US" sz="2000" b="1">
-                <a:solidFill>
-                  <a:schemeClr val="bg2"/>
-                </a:solidFill>
-              </a:rPr>
-              <a:t>Vienna University of Technology</a:t>
-            </a:r>
-          </a:p>
-        </p:txBody>
-      </p:sp>
-      <p:sp>
-        <p:nvSpPr>
-          <p:cNvPr id="7173" name="Text Box 5"/>
-          <p:cNvSpPr txBox="1">
-            <a:spLocks noChangeArrowheads="1"/>
-          </p:cNvSpPr>
-          <p:nvPr/>
-        </p:nvSpPr>
-        <p:spPr bwMode="auto">
-          <a:xfrm>
-            <a:off x="4427538" y="4652963"/>
-            <a:ext cx="4176712" cy="1463675"/>
-          </a:xfrm>
-          <a:prstGeom prst="rect">
-            <a:avLst/>
-          </a:prstGeom>
-          <a:noFill/>
-          <a:ln>
-            <a:noFill/>
-          </a:ln>
-          <a:extLst>
-            <a:ext uri="{909E8E84-426E-40DD-AFC4-6F175D3DCCD1}">
-              <a14:hiddenFill xmlns:a14="http://schemas.microsoft.com/office/drawing/2010/main">
-                <a:solidFill>
-                  <a:srgbClr val="FFFFFF"/>
-                </a:solidFill>
-              </a14:hiddenFill>
-            </a:ext>
-            <a:ext uri="{91240B29-F687-4F45-9708-019B960494DF}">
-              <a14:hiddenLine xmlns:a14="http://schemas.microsoft.com/office/drawing/2010/main" w="9525">
-                <a:solidFill>
-                  <a:srgbClr val="000000"/>
-                </a:solidFill>
-                <a:miter lim="800000"/>
-                <a:headEnd/>
-                <a:tailEnd/>
-              </a14:hiddenLine>
-            </a:ext>
-          </a:extLst>
-        </p:spPr>
-        <p:txBody>
-          <a:bodyPr>
-            <a:spAutoFit/>
-          </a:bodyPr>
-          <a:lstStyle>
-            <a:lvl1pPr eaLnBrk="0" hangingPunct="0">
-              <a:defRPr>
-                <a:solidFill>
-                  <a:schemeClr val="tx1"/>
-                </a:solidFill>
-                <a:latin typeface="Arial" charset="0"/>
-              </a:defRPr>
-            </a:lvl1pPr>
-            <a:lvl2pPr marL="742950" indent="-285750" eaLnBrk="0" hangingPunct="0">
-              <a:defRPr>
-                <a:solidFill>
-                  <a:schemeClr val="tx1"/>
-                </a:solidFill>
-                <a:latin typeface="Arial" charset="0"/>
-              </a:defRPr>
-            </a:lvl2pPr>
-            <a:lvl3pPr marL="1143000" indent="-228600" eaLnBrk="0" hangingPunct="0">
-              <a:defRPr>
-                <a:solidFill>
-                  <a:schemeClr val="tx1"/>
-                </a:solidFill>
-                <a:latin typeface="Arial" charset="0"/>
-              </a:defRPr>
-            </a:lvl3pPr>
-            <a:lvl4pPr marL="1600200" indent="-228600" eaLnBrk="0" hangingPunct="0">
-              <a:defRPr>
-                <a:solidFill>
-                  <a:schemeClr val="tx1"/>
-                </a:solidFill>
-                <a:latin typeface="Arial" charset="0"/>
-              </a:defRPr>
-            </a:lvl4pPr>
-            <a:lvl5pPr marL="2057400" indent="-228600" eaLnBrk="0" hangingPunct="0">
-              <a:defRPr>
-                <a:solidFill>
-                  <a:schemeClr val="tx1"/>
-                </a:solidFill>
-                <a:latin typeface="Arial" charset="0"/>
-              </a:defRPr>
-            </a:lvl5pPr>
-            <a:lvl6pPr marL="2514600" indent="-228600" eaLnBrk="0" fontAlgn="base" hangingPunct="0">
-              <a:spcBef>
-                <a:spcPct val="0"/>
-              </a:spcBef>
-              <a:spcAft>
-                <a:spcPct val="0"/>
-              </a:spcAft>
-              <a:defRPr>
-                <a:solidFill>
-                  <a:schemeClr val="tx1"/>
-                </a:solidFill>
-                <a:latin typeface="Arial" charset="0"/>
-              </a:defRPr>
-            </a:lvl6pPr>
-            <a:lvl7pPr marL="2971800" indent="-228600" eaLnBrk="0" fontAlgn="base" hangingPunct="0">
-              <a:spcBef>
-                <a:spcPct val="0"/>
-              </a:spcBef>
-              <a:spcAft>
-                <a:spcPct val="0"/>
-              </a:spcAft>
-              <a:defRPr>
-                <a:solidFill>
-                  <a:schemeClr val="tx1"/>
-                </a:solidFill>
-                <a:latin typeface="Arial" charset="0"/>
-              </a:defRPr>
-            </a:lvl7pPr>
-            <a:lvl8pPr marL="3429000" indent="-228600" eaLnBrk="0" fontAlgn="base" hangingPunct="0">
-              <a:spcBef>
-                <a:spcPct val="0"/>
-              </a:spcBef>
-              <a:spcAft>
-                <a:spcPct val="0"/>
-              </a:spcAft>
-              <a:defRPr>
-                <a:solidFill>
-                  <a:schemeClr val="tx1"/>
-                </a:solidFill>
-                <a:latin typeface="Arial" charset="0"/>
-              </a:defRPr>
-            </a:lvl8pPr>
-            <a:lvl9pPr marL="3886200" indent="-228600" eaLnBrk="0" fontAlgn="base" hangingPunct="0">
-              <a:spcBef>
-                <a:spcPct val="0"/>
-              </a:spcBef>
-              <a:spcAft>
-                <a:spcPct val="0"/>
-              </a:spcAft>
-              <a:defRPr>
-                <a:solidFill>
-                  <a:schemeClr val="tx1"/>
-                </a:solidFill>
-                <a:latin typeface="Arial" charset="0"/>
-              </a:defRPr>
-            </a:lvl9pPr>
-          </a:lstStyle>
-          <a:p>
-            <a:pPr algn="ctr" eaLnBrk="1" hangingPunct="1">
-              <a:spcBef>
-                <a:spcPct val="50000"/>
-              </a:spcBef>
-            </a:pPr>
-            <a:r>
-              <a:rPr lang="en-US" sz="2000" baseline="30000">
-                <a:solidFill>
-                  <a:schemeClr val="bg2"/>
-                </a:solidFill>
-              </a:rPr>
-              <a:t>2 </a:t>
-            </a:r>
-            <a:r>
-              <a:rPr lang="en-US" sz="2000">
-                <a:solidFill>
-                  <a:schemeClr val="bg2"/>
-                </a:solidFill>
-              </a:rPr>
-              <a:t>&lt;insert 2nd affiliation </a:t>
-            </a:r>
-            <a:br>
-              <a:rPr lang="en-US" sz="2000">
-                <a:solidFill>
-                  <a:schemeClr val="bg2"/>
-                </a:solidFill>
-              </a:rPr>
-            </a:br>
-            <a:r>
-              <a:rPr lang="en-US" sz="2000">
-                <a:solidFill>
-                  <a:schemeClr val="bg2"/>
-                </a:solidFill>
-              </a:rPr>
-              <a:t>(institute) here&gt;</a:t>
-            </a:r>
-          </a:p>
-          <a:p>
-            <a:pPr algn="ctr" eaLnBrk="1" hangingPunct="1">
-              <a:spcBef>
-                <a:spcPct val="50000"/>
-              </a:spcBef>
-            </a:pPr>
-            <a:r>
-              <a:rPr lang="en-US" sz="2000" b="1">
-                <a:solidFill>
-                  <a:schemeClr val="bg2"/>
-                </a:solidFill>
-              </a:rPr>
-              <a:t>&lt;insert 2nd affiliation </a:t>
-            </a:r>
-            <a:br>
-              <a:rPr lang="en-US" sz="2000" b="1">
-                <a:solidFill>
-                  <a:schemeClr val="bg2"/>
-                </a:solidFill>
-              </a:rPr>
-            </a:br>
-            <a:r>
-              <a:rPr lang="en-US" sz="2000" b="1">
-                <a:solidFill>
-                  <a:schemeClr val="bg2"/>
-                </a:solidFill>
-              </a:rPr>
-              <a:t>(university) here&gt;</a:t>
-            </a:r>
-          </a:p>
-        </p:txBody>
-      </p:sp>
-    </p:spTree>
-    <p:extLst>
-      <p:ext uri="{BB962C8B-B14F-4D97-AF65-F5344CB8AC3E}">
-        <p14:creationId xmlns:p14="http://schemas.microsoft.com/office/powerpoint/2010/main" val="2231343568"/>
-      </p:ext>
-    </p:extLst>
-  </p:cSld>
-  <p:clrMapOvr>
-    <a:masterClrMapping/>
-  </p:clrMapOvr>
-  <p:timing>
-    <p:tnLst>
-      <p:par>
-        <p:cTn id="1" dur="indefinite" restart="never" nodeType="tmRoot"/>
-      </p:par>
-    </p:tnLst>
-  </p:timing>
-</p:sld>
-</file>
-
-<file path=ppt/slides/slide6.xml><?xml version="1.0" encoding="utf-8"?>
-<p:sld xmlns:a="http://schemas.openxmlformats.org/drawingml/2006/main" xmlns:r="http://schemas.openxmlformats.org/officeDocument/2006/relationships" xmlns:p="http://schemas.openxmlformats.org/presentationml/2006/main">
-  <p:cSld>
-    <p:spTree>
-      <p:nvGrpSpPr>
-        <p:cNvPr id="1" name=""/>
-        <p:cNvGrpSpPr/>
-        <p:nvPr/>
-      </p:nvGrpSpPr>
-      <p:grpSpPr>
-        <a:xfrm>
-          <a:off x="0" y="0"/>
-          <a:ext cx="0" cy="0"/>
-          <a:chOff x="0" y="0"/>
-          <a:chExt cx="0" cy="0"/>
-        </a:xfrm>
-      </p:grpSpPr>
-      <p:sp>
-        <p:nvSpPr>
-          <p:cNvPr id="8194" name="Rectangle 2"/>
-          <p:cNvSpPr>
-            <a:spLocks noGrp="1" noChangeArrowheads="1"/>
-          </p:cNvSpPr>
-          <p:nvPr>
-            <p:ph type="ctrTitle"/>
-          </p:nvPr>
-        </p:nvSpPr>
-        <p:spPr/>
-        <p:txBody>
-          <a:bodyPr/>
-          <a:lstStyle/>
-          <a:p>
-            <a:pPr eaLnBrk="1" hangingPunct="1"/>
-            <a:r>
-              <a:rPr lang="en-US" smtClean="0"/>
-              <a:t>&lt;insert presentation title here&gt;</a:t>
-            </a:r>
-          </a:p>
-        </p:txBody>
-      </p:sp>
-      <p:sp>
-        <p:nvSpPr>
-          <p:cNvPr id="8195" name="Rectangle 3"/>
-          <p:cNvSpPr>
-            <a:spLocks noGrp="1" noChangeArrowheads="1"/>
-          </p:cNvSpPr>
-          <p:nvPr>
-            <p:ph type="subTitle" idx="1"/>
-          </p:nvPr>
-        </p:nvSpPr>
-        <p:spPr/>
-        <p:txBody>
-          <a:bodyPr/>
-          <a:lstStyle/>
-          <a:p>
-            <a:pPr eaLnBrk="1" hangingPunct="1"/>
-            <a:r>
-              <a:rPr lang="en-US" smtClean="0"/>
-              <a:t>&lt;1st author&gt;</a:t>
-            </a:r>
-            <a:r>
-              <a:rPr lang="en-US" baseline="30000" smtClean="0"/>
-              <a:t>1</a:t>
-            </a:r>
-            <a:r>
-              <a:rPr lang="en-US" smtClean="0"/>
-              <a:t>, &lt;2nd author&gt;</a:t>
-            </a:r>
-            <a:r>
-              <a:rPr lang="en-US" baseline="30000" smtClean="0"/>
-              <a:t>2</a:t>
-            </a:r>
-            <a:r>
-              <a:rPr lang="en-US" smtClean="0"/>
-              <a:t> and</a:t>
-            </a:r>
-            <a:br>
-              <a:rPr lang="en-US" smtClean="0"/>
-            </a:br>
-            <a:r>
-              <a:rPr lang="en-US" smtClean="0"/>
-              <a:t>&lt;3rd author&gt;</a:t>
-            </a:r>
-            <a:r>
-              <a:rPr lang="en-US" baseline="30000" smtClean="0"/>
-              <a:t>3</a:t>
-            </a:r>
-          </a:p>
-          <a:p>
-            <a:pPr eaLnBrk="1" hangingPunct="1"/>
-            <a:endParaRPr lang="en-US" baseline="30000" smtClean="0"/>
-          </a:p>
-        </p:txBody>
-      </p:sp>
-      <p:sp>
-        <p:nvSpPr>
-          <p:cNvPr id="8196" name="Text Box 4"/>
-          <p:cNvSpPr txBox="1">
-            <a:spLocks noChangeArrowheads="1"/>
-          </p:cNvSpPr>
-          <p:nvPr/>
-        </p:nvSpPr>
-        <p:spPr bwMode="auto">
-          <a:xfrm>
-            <a:off x="179388" y="4652963"/>
-            <a:ext cx="4176712" cy="947737"/>
-          </a:xfrm>
-          <a:prstGeom prst="rect">
-            <a:avLst/>
-          </a:prstGeom>
-          <a:noFill/>
-          <a:ln>
-            <a:noFill/>
-          </a:ln>
-          <a:extLst>
-            <a:ext uri="{909E8E84-426E-40DD-AFC4-6F175D3DCCD1}">
-              <a14:hiddenFill xmlns:a14="http://schemas.microsoft.com/office/drawing/2010/main">
-                <a:solidFill>
-                  <a:srgbClr val="FFFFFF"/>
-                </a:solidFill>
-              </a14:hiddenFill>
-            </a:ext>
-            <a:ext uri="{91240B29-F687-4F45-9708-019B960494DF}">
-              <a14:hiddenLine xmlns:a14="http://schemas.microsoft.com/office/drawing/2010/main" w="9525">
-                <a:solidFill>
-                  <a:srgbClr val="000000"/>
-                </a:solidFill>
-                <a:miter lim="800000"/>
-                <a:headEnd/>
-                <a:tailEnd/>
-              </a14:hiddenLine>
-            </a:ext>
-          </a:extLst>
-        </p:spPr>
-        <p:txBody>
-          <a:bodyPr>
-            <a:spAutoFit/>
-          </a:bodyPr>
-          <a:lstStyle>
-            <a:lvl1pPr eaLnBrk="0" hangingPunct="0">
-              <a:defRPr>
-                <a:solidFill>
-                  <a:schemeClr val="tx1"/>
-                </a:solidFill>
-                <a:latin typeface="Arial" charset="0"/>
-              </a:defRPr>
-            </a:lvl1pPr>
-            <a:lvl2pPr marL="742950" indent="-285750" eaLnBrk="0" hangingPunct="0">
-              <a:defRPr>
-                <a:solidFill>
-                  <a:schemeClr val="tx1"/>
-                </a:solidFill>
-                <a:latin typeface="Arial" charset="0"/>
-              </a:defRPr>
-            </a:lvl2pPr>
-            <a:lvl3pPr marL="1143000" indent="-228600" eaLnBrk="0" hangingPunct="0">
-              <a:defRPr>
-                <a:solidFill>
-                  <a:schemeClr val="tx1"/>
-                </a:solidFill>
-                <a:latin typeface="Arial" charset="0"/>
-              </a:defRPr>
-            </a:lvl3pPr>
-            <a:lvl4pPr marL="1600200" indent="-228600" eaLnBrk="0" hangingPunct="0">
-              <a:defRPr>
-                <a:solidFill>
-                  <a:schemeClr val="tx1"/>
-                </a:solidFill>
-                <a:latin typeface="Arial" charset="0"/>
-              </a:defRPr>
-            </a:lvl4pPr>
-            <a:lvl5pPr marL="2057400" indent="-228600" eaLnBrk="0" hangingPunct="0">
-              <a:defRPr>
-                <a:solidFill>
-                  <a:schemeClr val="tx1"/>
-                </a:solidFill>
-                <a:latin typeface="Arial" charset="0"/>
-              </a:defRPr>
-            </a:lvl5pPr>
-            <a:lvl6pPr marL="2514600" indent="-228600" eaLnBrk="0" fontAlgn="base" hangingPunct="0">
-              <a:spcBef>
-                <a:spcPct val="0"/>
-              </a:spcBef>
-              <a:spcAft>
-                <a:spcPct val="0"/>
-              </a:spcAft>
-              <a:defRPr>
-                <a:solidFill>
-                  <a:schemeClr val="tx1"/>
-                </a:solidFill>
-                <a:latin typeface="Arial" charset="0"/>
-              </a:defRPr>
-            </a:lvl6pPr>
-            <a:lvl7pPr marL="2971800" indent="-228600" eaLnBrk="0" fontAlgn="base" hangingPunct="0">
-              <a:spcBef>
-                <a:spcPct val="0"/>
-              </a:spcBef>
-              <a:spcAft>
-                <a:spcPct val="0"/>
-              </a:spcAft>
-              <a:defRPr>
-                <a:solidFill>
-                  <a:schemeClr val="tx1"/>
-                </a:solidFill>
-                <a:latin typeface="Arial" charset="0"/>
-              </a:defRPr>
-            </a:lvl7pPr>
-            <a:lvl8pPr marL="3429000" indent="-228600" eaLnBrk="0" fontAlgn="base" hangingPunct="0">
-              <a:spcBef>
-                <a:spcPct val="0"/>
-              </a:spcBef>
-              <a:spcAft>
-                <a:spcPct val="0"/>
-              </a:spcAft>
-              <a:defRPr>
-                <a:solidFill>
-                  <a:schemeClr val="tx1"/>
-                </a:solidFill>
-                <a:latin typeface="Arial" charset="0"/>
-              </a:defRPr>
-            </a:lvl8pPr>
-            <a:lvl9pPr marL="3886200" indent="-228600" eaLnBrk="0" fontAlgn="base" hangingPunct="0">
-              <a:spcBef>
-                <a:spcPct val="0"/>
-              </a:spcBef>
-              <a:spcAft>
-                <a:spcPct val="0"/>
-              </a:spcAft>
-              <a:defRPr>
-                <a:solidFill>
-                  <a:schemeClr val="tx1"/>
-                </a:solidFill>
-                <a:latin typeface="Arial" charset="0"/>
-              </a:defRPr>
-            </a:lvl9pPr>
-          </a:lstStyle>
-          <a:p>
-            <a:pPr algn="ctr" eaLnBrk="1" hangingPunct="1">
-              <a:spcBef>
-                <a:spcPct val="50000"/>
-              </a:spcBef>
-            </a:pPr>
-            <a:r>
-              <a:rPr lang="en-US" sz="1600" baseline="30000">
-                <a:solidFill>
-                  <a:schemeClr val="bg2"/>
-                </a:solidFill>
-              </a:rPr>
-              <a:t>1</a:t>
-            </a:r>
-            <a:r>
-              <a:rPr lang="en-US" sz="1600">
-                <a:solidFill>
-                  <a:schemeClr val="bg2"/>
-                </a:solidFill>
-              </a:rPr>
-              <a:t> Institute of Computer Graphics</a:t>
-            </a:r>
-            <a:br>
-              <a:rPr lang="en-US" sz="1600">
-                <a:solidFill>
-                  <a:schemeClr val="bg2"/>
-                </a:solidFill>
-              </a:rPr>
-            </a:br>
-            <a:r>
-              <a:rPr lang="en-US" sz="1600">
-                <a:solidFill>
-                  <a:schemeClr val="bg2"/>
-                </a:solidFill>
-              </a:rPr>
-              <a:t>and Algorithms</a:t>
-            </a:r>
-          </a:p>
-          <a:p>
-            <a:pPr algn="ctr" eaLnBrk="1" hangingPunct="1">
-              <a:spcBef>
-                <a:spcPct val="50000"/>
-              </a:spcBef>
-            </a:pPr>
-            <a:r>
-              <a:rPr lang="en-US" sz="1600" b="1">
-                <a:solidFill>
-                  <a:schemeClr val="bg2"/>
-                </a:solidFill>
-              </a:rPr>
-              <a:t>Vienna University of Technology</a:t>
-            </a:r>
-          </a:p>
-        </p:txBody>
-      </p:sp>
-      <p:sp>
-        <p:nvSpPr>
-          <p:cNvPr id="8197" name="Text Box 5"/>
-          <p:cNvSpPr txBox="1">
-            <a:spLocks noChangeArrowheads="1"/>
-          </p:cNvSpPr>
-          <p:nvPr/>
-        </p:nvSpPr>
-        <p:spPr bwMode="auto">
-          <a:xfrm>
-            <a:off x="4427538" y="4652963"/>
-            <a:ext cx="4176712" cy="947737"/>
-          </a:xfrm>
-          <a:prstGeom prst="rect">
-            <a:avLst/>
-          </a:prstGeom>
-          <a:noFill/>
-          <a:ln>
-            <a:noFill/>
-          </a:ln>
-          <a:extLst>
-            <a:ext uri="{909E8E84-426E-40DD-AFC4-6F175D3DCCD1}">
-              <a14:hiddenFill xmlns:a14="http://schemas.microsoft.com/office/drawing/2010/main">
-                <a:solidFill>
-                  <a:srgbClr val="FFFFFF"/>
-                </a:solidFill>
-              </a14:hiddenFill>
-            </a:ext>
-            <a:ext uri="{91240B29-F687-4F45-9708-019B960494DF}">
-              <a14:hiddenLine xmlns:a14="http://schemas.microsoft.com/office/drawing/2010/main" w="9525">
-                <a:solidFill>
-                  <a:srgbClr val="000000"/>
-                </a:solidFill>
-                <a:miter lim="800000"/>
-                <a:headEnd/>
-                <a:tailEnd/>
-              </a14:hiddenLine>
-            </a:ext>
-          </a:extLst>
-        </p:spPr>
-        <p:txBody>
-          <a:bodyPr>
-            <a:spAutoFit/>
-          </a:bodyPr>
-          <a:lstStyle>
-            <a:lvl1pPr eaLnBrk="0" hangingPunct="0">
-              <a:defRPr>
-                <a:solidFill>
-                  <a:schemeClr val="tx1"/>
-                </a:solidFill>
-                <a:latin typeface="Arial" charset="0"/>
-              </a:defRPr>
-            </a:lvl1pPr>
-            <a:lvl2pPr marL="742950" indent="-285750" eaLnBrk="0" hangingPunct="0">
-              <a:defRPr>
-                <a:solidFill>
-                  <a:schemeClr val="tx1"/>
-                </a:solidFill>
-                <a:latin typeface="Arial" charset="0"/>
-              </a:defRPr>
-            </a:lvl2pPr>
-            <a:lvl3pPr marL="1143000" indent="-228600" eaLnBrk="0" hangingPunct="0">
-              <a:defRPr>
-                <a:solidFill>
-                  <a:schemeClr val="tx1"/>
-                </a:solidFill>
-                <a:latin typeface="Arial" charset="0"/>
-              </a:defRPr>
-            </a:lvl3pPr>
-            <a:lvl4pPr marL="1600200" indent="-228600" eaLnBrk="0" hangingPunct="0">
-              <a:defRPr>
-                <a:solidFill>
-                  <a:schemeClr val="tx1"/>
-                </a:solidFill>
-                <a:latin typeface="Arial" charset="0"/>
-              </a:defRPr>
-            </a:lvl4pPr>
-            <a:lvl5pPr marL="2057400" indent="-228600" eaLnBrk="0" hangingPunct="0">
-              <a:defRPr>
-                <a:solidFill>
-                  <a:schemeClr val="tx1"/>
-                </a:solidFill>
-                <a:latin typeface="Arial" charset="0"/>
-              </a:defRPr>
-            </a:lvl5pPr>
-            <a:lvl6pPr marL="2514600" indent="-228600" eaLnBrk="0" fontAlgn="base" hangingPunct="0">
-              <a:spcBef>
-                <a:spcPct val="0"/>
-              </a:spcBef>
-              <a:spcAft>
-                <a:spcPct val="0"/>
-              </a:spcAft>
-              <a:defRPr>
-                <a:solidFill>
-                  <a:schemeClr val="tx1"/>
-                </a:solidFill>
-                <a:latin typeface="Arial" charset="0"/>
-              </a:defRPr>
-            </a:lvl6pPr>
-            <a:lvl7pPr marL="2971800" indent="-228600" eaLnBrk="0" fontAlgn="base" hangingPunct="0">
-              <a:spcBef>
-                <a:spcPct val="0"/>
-              </a:spcBef>
-              <a:spcAft>
-                <a:spcPct val="0"/>
-              </a:spcAft>
-              <a:defRPr>
-                <a:solidFill>
-                  <a:schemeClr val="tx1"/>
-                </a:solidFill>
-                <a:latin typeface="Arial" charset="0"/>
-              </a:defRPr>
-            </a:lvl7pPr>
-            <a:lvl8pPr marL="3429000" indent="-228600" eaLnBrk="0" fontAlgn="base" hangingPunct="0">
-              <a:spcBef>
-                <a:spcPct val="0"/>
-              </a:spcBef>
-              <a:spcAft>
-                <a:spcPct val="0"/>
-              </a:spcAft>
-              <a:defRPr>
-                <a:solidFill>
-                  <a:schemeClr val="tx1"/>
-                </a:solidFill>
-                <a:latin typeface="Arial" charset="0"/>
-              </a:defRPr>
-            </a:lvl8pPr>
-            <a:lvl9pPr marL="3886200" indent="-228600" eaLnBrk="0" fontAlgn="base" hangingPunct="0">
-              <a:spcBef>
-                <a:spcPct val="0"/>
-              </a:spcBef>
-              <a:spcAft>
-                <a:spcPct val="0"/>
-              </a:spcAft>
-              <a:defRPr>
-                <a:solidFill>
-                  <a:schemeClr val="tx1"/>
-                </a:solidFill>
-                <a:latin typeface="Arial" charset="0"/>
-              </a:defRPr>
-            </a:lvl9pPr>
-          </a:lstStyle>
-          <a:p>
-            <a:pPr algn="ctr" eaLnBrk="1" hangingPunct="1">
-              <a:spcBef>
-                <a:spcPct val="50000"/>
-              </a:spcBef>
-            </a:pPr>
-            <a:r>
-              <a:rPr lang="en-US" sz="1600" baseline="30000">
-                <a:solidFill>
-                  <a:schemeClr val="bg2"/>
-                </a:solidFill>
-              </a:rPr>
-              <a:t>2 </a:t>
-            </a:r>
-            <a:r>
-              <a:rPr lang="en-US" sz="1600">
-                <a:solidFill>
-                  <a:schemeClr val="bg2"/>
-                </a:solidFill>
-              </a:rPr>
-              <a:t>&lt;insert 2nd affiliation (institute) here&gt;</a:t>
-            </a:r>
-          </a:p>
-          <a:p>
-            <a:pPr algn="ctr" eaLnBrk="1" hangingPunct="1">
-              <a:spcBef>
-                <a:spcPct val="50000"/>
-              </a:spcBef>
-            </a:pPr>
-            <a:r>
-              <a:rPr lang="en-US" sz="1600" b="1">
-                <a:solidFill>
-                  <a:schemeClr val="bg2"/>
-                </a:solidFill>
-              </a:rPr>
-              <a:t>&lt;insert 2nd affiliation</a:t>
-            </a:r>
-            <a:br>
-              <a:rPr lang="en-US" sz="1600" b="1">
-                <a:solidFill>
-                  <a:schemeClr val="bg2"/>
-                </a:solidFill>
-              </a:rPr>
-            </a:br>
-            <a:r>
-              <a:rPr lang="en-US" sz="1600" b="1">
-                <a:solidFill>
-                  <a:schemeClr val="bg2"/>
-                </a:solidFill>
-              </a:rPr>
-              <a:t>(university) here&gt;</a:t>
-            </a:r>
-          </a:p>
-        </p:txBody>
-      </p:sp>
-      <p:sp>
-        <p:nvSpPr>
-          <p:cNvPr id="8198" name="Text Box 6"/>
-          <p:cNvSpPr txBox="1">
-            <a:spLocks noChangeArrowheads="1"/>
-          </p:cNvSpPr>
-          <p:nvPr/>
-        </p:nvSpPr>
-        <p:spPr bwMode="auto">
-          <a:xfrm>
-            <a:off x="2266950" y="5865813"/>
-            <a:ext cx="4176713" cy="947737"/>
-          </a:xfrm>
-          <a:prstGeom prst="rect">
-            <a:avLst/>
-          </a:prstGeom>
-          <a:noFill/>
-          <a:ln>
-            <a:noFill/>
-          </a:ln>
-          <a:extLst>
-            <a:ext uri="{909E8E84-426E-40DD-AFC4-6F175D3DCCD1}">
-              <a14:hiddenFill xmlns:a14="http://schemas.microsoft.com/office/drawing/2010/main">
-                <a:solidFill>
-                  <a:srgbClr val="FFFFFF"/>
-                </a:solidFill>
-              </a14:hiddenFill>
-            </a:ext>
-            <a:ext uri="{91240B29-F687-4F45-9708-019B960494DF}">
-              <a14:hiddenLine xmlns:a14="http://schemas.microsoft.com/office/drawing/2010/main" w="9525">
-                <a:solidFill>
-                  <a:srgbClr val="000000"/>
-                </a:solidFill>
-                <a:miter lim="800000"/>
-                <a:headEnd/>
-                <a:tailEnd/>
-              </a14:hiddenLine>
-            </a:ext>
-          </a:extLst>
-        </p:spPr>
-        <p:txBody>
-          <a:bodyPr>
-            <a:spAutoFit/>
-          </a:bodyPr>
-          <a:lstStyle>
-            <a:lvl1pPr eaLnBrk="0" hangingPunct="0">
-              <a:defRPr>
-                <a:solidFill>
-                  <a:schemeClr val="tx1"/>
-                </a:solidFill>
-                <a:latin typeface="Arial" charset="0"/>
-              </a:defRPr>
-            </a:lvl1pPr>
-            <a:lvl2pPr marL="742950" indent="-285750" eaLnBrk="0" hangingPunct="0">
-              <a:defRPr>
-                <a:solidFill>
-                  <a:schemeClr val="tx1"/>
-                </a:solidFill>
-                <a:latin typeface="Arial" charset="0"/>
-              </a:defRPr>
-            </a:lvl2pPr>
-            <a:lvl3pPr marL="1143000" indent="-228600" eaLnBrk="0" hangingPunct="0">
-              <a:defRPr>
-                <a:solidFill>
-                  <a:schemeClr val="tx1"/>
-                </a:solidFill>
-                <a:latin typeface="Arial" charset="0"/>
-              </a:defRPr>
-            </a:lvl3pPr>
-            <a:lvl4pPr marL="1600200" indent="-228600" eaLnBrk="0" hangingPunct="0">
-              <a:defRPr>
-                <a:solidFill>
-                  <a:schemeClr val="tx1"/>
-                </a:solidFill>
-                <a:latin typeface="Arial" charset="0"/>
-              </a:defRPr>
-            </a:lvl4pPr>
-            <a:lvl5pPr marL="2057400" indent="-228600" eaLnBrk="0" hangingPunct="0">
-              <a:defRPr>
-                <a:solidFill>
-                  <a:schemeClr val="tx1"/>
-                </a:solidFill>
-                <a:latin typeface="Arial" charset="0"/>
-              </a:defRPr>
-            </a:lvl5pPr>
-            <a:lvl6pPr marL="2514600" indent="-228600" eaLnBrk="0" fontAlgn="base" hangingPunct="0">
-              <a:spcBef>
-                <a:spcPct val="0"/>
-              </a:spcBef>
-              <a:spcAft>
-                <a:spcPct val="0"/>
-              </a:spcAft>
-              <a:defRPr>
-                <a:solidFill>
-                  <a:schemeClr val="tx1"/>
-                </a:solidFill>
-                <a:latin typeface="Arial" charset="0"/>
-              </a:defRPr>
-            </a:lvl6pPr>
-            <a:lvl7pPr marL="2971800" indent="-228600" eaLnBrk="0" fontAlgn="base" hangingPunct="0">
-              <a:spcBef>
-                <a:spcPct val="0"/>
-              </a:spcBef>
-              <a:spcAft>
-                <a:spcPct val="0"/>
-              </a:spcAft>
-              <a:defRPr>
-                <a:solidFill>
-                  <a:schemeClr val="tx1"/>
-                </a:solidFill>
-                <a:latin typeface="Arial" charset="0"/>
-              </a:defRPr>
-            </a:lvl7pPr>
-            <a:lvl8pPr marL="3429000" indent="-228600" eaLnBrk="0" fontAlgn="base" hangingPunct="0">
-              <a:spcBef>
-                <a:spcPct val="0"/>
-              </a:spcBef>
-              <a:spcAft>
-                <a:spcPct val="0"/>
-              </a:spcAft>
-              <a:defRPr>
-                <a:solidFill>
-                  <a:schemeClr val="tx1"/>
-                </a:solidFill>
-                <a:latin typeface="Arial" charset="0"/>
-              </a:defRPr>
-            </a:lvl8pPr>
-            <a:lvl9pPr marL="3886200" indent="-228600" eaLnBrk="0" fontAlgn="base" hangingPunct="0">
-              <a:spcBef>
-                <a:spcPct val="0"/>
-              </a:spcBef>
-              <a:spcAft>
-                <a:spcPct val="0"/>
-              </a:spcAft>
-              <a:defRPr>
-                <a:solidFill>
-                  <a:schemeClr val="tx1"/>
-                </a:solidFill>
-                <a:latin typeface="Arial" charset="0"/>
-              </a:defRPr>
-            </a:lvl9pPr>
-          </a:lstStyle>
-          <a:p>
-            <a:pPr algn="ctr" eaLnBrk="1" hangingPunct="1">
-              <a:spcBef>
-                <a:spcPct val="50000"/>
-              </a:spcBef>
-            </a:pPr>
-            <a:r>
-              <a:rPr lang="en-US" sz="1600" baseline="30000">
-                <a:solidFill>
-                  <a:schemeClr val="bg2"/>
-                </a:solidFill>
-              </a:rPr>
-              <a:t>3 </a:t>
-            </a:r>
-            <a:r>
-              <a:rPr lang="en-US" sz="1600">
-                <a:solidFill>
-                  <a:schemeClr val="bg2"/>
-                </a:solidFill>
-              </a:rPr>
-              <a:t>&lt;insert 3rd affiliation (institute) here&gt;</a:t>
-            </a:r>
-          </a:p>
-          <a:p>
-            <a:pPr algn="ctr" eaLnBrk="1" hangingPunct="1">
-              <a:spcBef>
-                <a:spcPct val="50000"/>
-              </a:spcBef>
-            </a:pPr>
-            <a:r>
-              <a:rPr lang="en-US" sz="1600" b="1">
-                <a:solidFill>
-                  <a:schemeClr val="bg2"/>
-                </a:solidFill>
-              </a:rPr>
-              <a:t>&lt;insert 3rd affiliation </a:t>
-            </a:r>
-            <a:br>
-              <a:rPr lang="en-US" sz="1600" b="1">
-                <a:solidFill>
-                  <a:schemeClr val="bg2"/>
-                </a:solidFill>
-              </a:rPr>
-            </a:br>
-            <a:r>
-              <a:rPr lang="en-US" sz="1600" b="1">
-                <a:solidFill>
-                  <a:schemeClr val="bg2"/>
-                </a:solidFill>
-              </a:rPr>
-              <a:t>(university) here&gt;</a:t>
-            </a:r>
-          </a:p>
-        </p:txBody>
-      </p:sp>
-    </p:spTree>
-    <p:extLst>
-      <p:ext uri="{BB962C8B-B14F-4D97-AF65-F5344CB8AC3E}">
-        <p14:creationId xmlns:p14="http://schemas.microsoft.com/office/powerpoint/2010/main" val="3867160007"/>
-      </p:ext>
-    </p:extLst>
-  </p:cSld>
-  <p:clrMapOvr>
-    <a:masterClrMapping/>
-  </p:clrMapOvr>
-  <p:timing>
-    <p:tnLst>
-      <p:par>
-        <p:cTn id="1" dur="indefinite" restart="never" nodeType="tmRoot"/>
-      </p:par>
-    </p:tnLst>
-  </p:timing>
-</p:sld>
-</file>
-
-<file path=ppt/slides/slide7.xml><?xml version="1.0" encoding="utf-8"?>
-<p:sld xmlns:a="http://schemas.openxmlformats.org/drawingml/2006/main" xmlns:r="http://schemas.openxmlformats.org/officeDocument/2006/relationships" xmlns:p="http://schemas.openxmlformats.org/presentationml/2006/main">
-  <p:cSld>
-    <p:spTree>
-      <p:nvGrpSpPr>
-        <p:cNvPr id="1" name=""/>
-        <p:cNvGrpSpPr/>
-        <p:nvPr/>
-      </p:nvGrpSpPr>
-      <p:grpSpPr>
-        <a:xfrm>
-          <a:off x="0" y="0"/>
-          <a:ext cx="0" cy="0"/>
-          <a:chOff x="0" y="0"/>
-          <a:chExt cx="0" cy="0"/>
-        </a:xfrm>
-      </p:grpSpPr>
-      <p:sp>
-        <p:nvSpPr>
-          <p:cNvPr id="9218" name="Rectangle 2"/>
-          <p:cNvSpPr>
-            <a:spLocks noGrp="1" noChangeArrowheads="1"/>
-          </p:cNvSpPr>
-          <p:nvPr>
-            <p:ph type="ctrTitle"/>
-          </p:nvPr>
-        </p:nvSpPr>
-        <p:spPr/>
-        <p:txBody>
-          <a:bodyPr/>
-          <a:lstStyle/>
-          <a:p>
-            <a:pPr eaLnBrk="1" hangingPunct="1"/>
-            <a:r>
-              <a:rPr lang="en-US" smtClean="0"/>
-              <a:t>&lt;insert presentation title here&gt;</a:t>
-            </a:r>
-          </a:p>
-        </p:txBody>
-      </p:sp>
-      <p:sp>
-        <p:nvSpPr>
-          <p:cNvPr id="9219" name="Rectangle 3"/>
-          <p:cNvSpPr>
-            <a:spLocks noGrp="1" noChangeArrowheads="1"/>
-          </p:cNvSpPr>
-          <p:nvPr>
-            <p:ph type="subTitle" idx="1"/>
-          </p:nvPr>
-        </p:nvSpPr>
-        <p:spPr/>
-        <p:txBody>
-          <a:bodyPr/>
-          <a:lstStyle/>
-          <a:p>
-            <a:pPr eaLnBrk="1" hangingPunct="1"/>
-            <a:r>
-              <a:rPr lang="en-US" smtClean="0"/>
-              <a:t>&lt;1st author&gt;</a:t>
-            </a:r>
-            <a:r>
-              <a:rPr lang="en-US" baseline="30000" smtClean="0"/>
-              <a:t>1</a:t>
-            </a:r>
-            <a:r>
-              <a:rPr lang="en-US" smtClean="0"/>
-              <a:t>, &lt;2nd author&gt;</a:t>
-            </a:r>
-            <a:r>
-              <a:rPr lang="en-US" baseline="30000" smtClean="0"/>
-              <a:t>2</a:t>
-            </a:r>
-            <a:r>
-              <a:rPr lang="en-US" smtClean="0"/>
-              <a:t>,</a:t>
-            </a:r>
-            <a:br>
-              <a:rPr lang="en-US" smtClean="0"/>
-            </a:br>
-            <a:r>
-              <a:rPr lang="en-US" smtClean="0"/>
-              <a:t>&lt;3rd author&gt;</a:t>
-            </a:r>
-            <a:r>
-              <a:rPr lang="en-US" baseline="30000" smtClean="0"/>
-              <a:t>3</a:t>
-            </a:r>
-            <a:r>
-              <a:rPr lang="en-US" smtClean="0"/>
-              <a:t> and &lt;4th author&gt;</a:t>
-            </a:r>
-            <a:r>
-              <a:rPr lang="en-US" baseline="30000" smtClean="0"/>
-              <a:t>4</a:t>
-            </a:r>
-          </a:p>
-        </p:txBody>
-      </p:sp>
-      <p:sp>
-        <p:nvSpPr>
-          <p:cNvPr id="9220" name="Text Box 4"/>
-          <p:cNvSpPr txBox="1">
-            <a:spLocks noChangeArrowheads="1"/>
-          </p:cNvSpPr>
-          <p:nvPr/>
-        </p:nvSpPr>
-        <p:spPr bwMode="auto">
-          <a:xfrm>
-            <a:off x="4427538" y="4652963"/>
-            <a:ext cx="4176712" cy="947737"/>
-          </a:xfrm>
-          <a:prstGeom prst="rect">
-            <a:avLst/>
-          </a:prstGeom>
-          <a:noFill/>
-          <a:ln>
-            <a:noFill/>
-          </a:ln>
-          <a:extLst>
-            <a:ext uri="{909E8E84-426E-40DD-AFC4-6F175D3DCCD1}">
-              <a14:hiddenFill xmlns:a14="http://schemas.microsoft.com/office/drawing/2010/main">
-                <a:solidFill>
-                  <a:srgbClr val="FFFFFF"/>
-                </a:solidFill>
-              </a14:hiddenFill>
-            </a:ext>
-            <a:ext uri="{91240B29-F687-4F45-9708-019B960494DF}">
-              <a14:hiddenLine xmlns:a14="http://schemas.microsoft.com/office/drawing/2010/main" w="9525">
-                <a:solidFill>
-                  <a:srgbClr val="000000"/>
-                </a:solidFill>
-                <a:miter lim="800000"/>
-                <a:headEnd/>
-                <a:tailEnd/>
-              </a14:hiddenLine>
-            </a:ext>
-          </a:extLst>
-        </p:spPr>
-        <p:txBody>
-          <a:bodyPr>
-            <a:spAutoFit/>
-          </a:bodyPr>
-          <a:lstStyle>
-            <a:lvl1pPr eaLnBrk="0" hangingPunct="0">
-              <a:defRPr>
-                <a:solidFill>
-                  <a:schemeClr val="tx1"/>
-                </a:solidFill>
-                <a:latin typeface="Arial" charset="0"/>
-              </a:defRPr>
-            </a:lvl1pPr>
-            <a:lvl2pPr marL="742950" indent="-285750" eaLnBrk="0" hangingPunct="0">
-              <a:defRPr>
-                <a:solidFill>
-                  <a:schemeClr val="tx1"/>
-                </a:solidFill>
-                <a:latin typeface="Arial" charset="0"/>
-              </a:defRPr>
-            </a:lvl2pPr>
-            <a:lvl3pPr marL="1143000" indent="-228600" eaLnBrk="0" hangingPunct="0">
-              <a:defRPr>
-                <a:solidFill>
-                  <a:schemeClr val="tx1"/>
-                </a:solidFill>
-                <a:latin typeface="Arial" charset="0"/>
-              </a:defRPr>
-            </a:lvl3pPr>
-            <a:lvl4pPr marL="1600200" indent="-228600" eaLnBrk="0" hangingPunct="0">
-              <a:defRPr>
-                <a:solidFill>
-                  <a:schemeClr val="tx1"/>
-                </a:solidFill>
-                <a:latin typeface="Arial" charset="0"/>
-              </a:defRPr>
-            </a:lvl4pPr>
-            <a:lvl5pPr marL="2057400" indent="-228600" eaLnBrk="0" hangingPunct="0">
-              <a:defRPr>
-                <a:solidFill>
-                  <a:schemeClr val="tx1"/>
-                </a:solidFill>
-                <a:latin typeface="Arial" charset="0"/>
-              </a:defRPr>
-            </a:lvl5pPr>
-            <a:lvl6pPr marL="2514600" indent="-228600" eaLnBrk="0" fontAlgn="base" hangingPunct="0">
-              <a:spcBef>
-                <a:spcPct val="0"/>
-              </a:spcBef>
-              <a:spcAft>
-                <a:spcPct val="0"/>
-              </a:spcAft>
-              <a:defRPr>
-                <a:solidFill>
-                  <a:schemeClr val="tx1"/>
-                </a:solidFill>
-                <a:latin typeface="Arial" charset="0"/>
-              </a:defRPr>
-            </a:lvl6pPr>
-            <a:lvl7pPr marL="2971800" indent="-228600" eaLnBrk="0" fontAlgn="base" hangingPunct="0">
-              <a:spcBef>
-                <a:spcPct val="0"/>
-              </a:spcBef>
-              <a:spcAft>
-                <a:spcPct val="0"/>
-              </a:spcAft>
-              <a:defRPr>
-                <a:solidFill>
-                  <a:schemeClr val="tx1"/>
-                </a:solidFill>
-                <a:latin typeface="Arial" charset="0"/>
-              </a:defRPr>
-            </a:lvl7pPr>
-            <a:lvl8pPr marL="3429000" indent="-228600" eaLnBrk="0" fontAlgn="base" hangingPunct="0">
-              <a:spcBef>
-                <a:spcPct val="0"/>
-              </a:spcBef>
-              <a:spcAft>
-                <a:spcPct val="0"/>
-              </a:spcAft>
-              <a:defRPr>
-                <a:solidFill>
-                  <a:schemeClr val="tx1"/>
-                </a:solidFill>
-                <a:latin typeface="Arial" charset="0"/>
-              </a:defRPr>
-            </a:lvl8pPr>
-            <a:lvl9pPr marL="3886200" indent="-228600" eaLnBrk="0" fontAlgn="base" hangingPunct="0">
-              <a:spcBef>
-                <a:spcPct val="0"/>
-              </a:spcBef>
-              <a:spcAft>
-                <a:spcPct val="0"/>
-              </a:spcAft>
-              <a:defRPr>
-                <a:solidFill>
-                  <a:schemeClr val="tx1"/>
-                </a:solidFill>
-                <a:latin typeface="Arial" charset="0"/>
-              </a:defRPr>
-            </a:lvl9pPr>
-          </a:lstStyle>
-          <a:p>
-            <a:pPr algn="ctr" eaLnBrk="1" hangingPunct="1">
-              <a:spcBef>
-                <a:spcPct val="50000"/>
-              </a:spcBef>
-            </a:pPr>
-            <a:r>
-              <a:rPr lang="en-US" sz="1600" baseline="30000">
-                <a:solidFill>
-                  <a:schemeClr val="bg2"/>
-                </a:solidFill>
-              </a:rPr>
-              <a:t>2 </a:t>
-            </a:r>
-            <a:r>
-              <a:rPr lang="en-US" sz="1600">
-                <a:solidFill>
-                  <a:schemeClr val="bg2"/>
-                </a:solidFill>
-              </a:rPr>
-              <a:t>&lt;insert 2nd affiliation (institute) here&gt;</a:t>
-            </a:r>
-          </a:p>
-          <a:p>
-            <a:pPr algn="ctr" eaLnBrk="1" hangingPunct="1">
-              <a:spcBef>
-                <a:spcPct val="50000"/>
-              </a:spcBef>
-            </a:pPr>
-            <a:r>
-              <a:rPr lang="en-US" sz="1600" b="1">
-                <a:solidFill>
-                  <a:schemeClr val="bg2"/>
-                </a:solidFill>
-              </a:rPr>
-              <a:t>&lt;insert 2nd affiliation</a:t>
-            </a:r>
-            <a:br>
-              <a:rPr lang="en-US" sz="1600" b="1">
-                <a:solidFill>
-                  <a:schemeClr val="bg2"/>
-                </a:solidFill>
-              </a:rPr>
-            </a:br>
-            <a:r>
-              <a:rPr lang="en-US" sz="1600" b="1">
-                <a:solidFill>
-                  <a:schemeClr val="bg2"/>
-                </a:solidFill>
-              </a:rPr>
-              <a:t>(university) here&gt;</a:t>
-            </a:r>
-          </a:p>
-        </p:txBody>
-      </p:sp>
-      <p:sp>
-        <p:nvSpPr>
-          <p:cNvPr id="9221" name="Text Box 5"/>
-          <p:cNvSpPr txBox="1">
-            <a:spLocks noChangeArrowheads="1"/>
-          </p:cNvSpPr>
-          <p:nvPr/>
-        </p:nvSpPr>
-        <p:spPr bwMode="auto">
-          <a:xfrm>
-            <a:off x="179388" y="5865813"/>
-            <a:ext cx="4176712" cy="947737"/>
-          </a:xfrm>
-          <a:prstGeom prst="rect">
-            <a:avLst/>
-          </a:prstGeom>
-          <a:noFill/>
-          <a:ln>
-            <a:noFill/>
-          </a:ln>
-          <a:extLst>
-            <a:ext uri="{909E8E84-426E-40DD-AFC4-6F175D3DCCD1}">
-              <a14:hiddenFill xmlns:a14="http://schemas.microsoft.com/office/drawing/2010/main">
-                <a:solidFill>
-                  <a:srgbClr val="FFFFFF"/>
-                </a:solidFill>
-              </a14:hiddenFill>
-            </a:ext>
-            <a:ext uri="{91240B29-F687-4F45-9708-019B960494DF}">
-              <a14:hiddenLine xmlns:a14="http://schemas.microsoft.com/office/drawing/2010/main" w="9525">
-                <a:solidFill>
-                  <a:srgbClr val="000000"/>
-                </a:solidFill>
-                <a:miter lim="800000"/>
-                <a:headEnd/>
-                <a:tailEnd/>
-              </a14:hiddenLine>
-            </a:ext>
-          </a:extLst>
-        </p:spPr>
-        <p:txBody>
-          <a:bodyPr>
-            <a:spAutoFit/>
-          </a:bodyPr>
-          <a:lstStyle>
-            <a:lvl1pPr eaLnBrk="0" hangingPunct="0">
-              <a:defRPr>
-                <a:solidFill>
-                  <a:schemeClr val="tx1"/>
-                </a:solidFill>
-                <a:latin typeface="Arial" charset="0"/>
-              </a:defRPr>
-            </a:lvl1pPr>
-            <a:lvl2pPr marL="742950" indent="-285750" eaLnBrk="0" hangingPunct="0">
-              <a:defRPr>
-                <a:solidFill>
-                  <a:schemeClr val="tx1"/>
-                </a:solidFill>
-                <a:latin typeface="Arial" charset="0"/>
-              </a:defRPr>
-            </a:lvl2pPr>
-            <a:lvl3pPr marL="1143000" indent="-228600" eaLnBrk="0" hangingPunct="0">
-              <a:defRPr>
-                <a:solidFill>
-                  <a:schemeClr val="tx1"/>
-                </a:solidFill>
-                <a:latin typeface="Arial" charset="0"/>
-              </a:defRPr>
-            </a:lvl3pPr>
-            <a:lvl4pPr marL="1600200" indent="-228600" eaLnBrk="0" hangingPunct="0">
-              <a:defRPr>
-                <a:solidFill>
-                  <a:schemeClr val="tx1"/>
-                </a:solidFill>
-                <a:latin typeface="Arial" charset="0"/>
-              </a:defRPr>
-            </a:lvl4pPr>
-            <a:lvl5pPr marL="2057400" indent="-228600" eaLnBrk="0" hangingPunct="0">
-              <a:defRPr>
-                <a:solidFill>
-                  <a:schemeClr val="tx1"/>
-                </a:solidFill>
-                <a:latin typeface="Arial" charset="0"/>
-              </a:defRPr>
-            </a:lvl5pPr>
-            <a:lvl6pPr marL="2514600" indent="-228600" eaLnBrk="0" fontAlgn="base" hangingPunct="0">
-              <a:spcBef>
-                <a:spcPct val="0"/>
-              </a:spcBef>
-              <a:spcAft>
-                <a:spcPct val="0"/>
-              </a:spcAft>
-              <a:defRPr>
-                <a:solidFill>
-                  <a:schemeClr val="tx1"/>
-                </a:solidFill>
-                <a:latin typeface="Arial" charset="0"/>
-              </a:defRPr>
-            </a:lvl6pPr>
-            <a:lvl7pPr marL="2971800" indent="-228600" eaLnBrk="0" fontAlgn="base" hangingPunct="0">
-              <a:spcBef>
-                <a:spcPct val="0"/>
-              </a:spcBef>
-              <a:spcAft>
-                <a:spcPct val="0"/>
-              </a:spcAft>
-              <a:defRPr>
-                <a:solidFill>
-                  <a:schemeClr val="tx1"/>
-                </a:solidFill>
-                <a:latin typeface="Arial" charset="0"/>
-              </a:defRPr>
-            </a:lvl7pPr>
-            <a:lvl8pPr marL="3429000" indent="-228600" eaLnBrk="0" fontAlgn="base" hangingPunct="0">
-              <a:spcBef>
-                <a:spcPct val="0"/>
-              </a:spcBef>
-              <a:spcAft>
-                <a:spcPct val="0"/>
-              </a:spcAft>
-              <a:defRPr>
-                <a:solidFill>
-                  <a:schemeClr val="tx1"/>
-                </a:solidFill>
-                <a:latin typeface="Arial" charset="0"/>
-              </a:defRPr>
-            </a:lvl8pPr>
-            <a:lvl9pPr marL="3886200" indent="-228600" eaLnBrk="0" fontAlgn="base" hangingPunct="0">
-              <a:spcBef>
-                <a:spcPct val="0"/>
-              </a:spcBef>
-              <a:spcAft>
-                <a:spcPct val="0"/>
-              </a:spcAft>
-              <a:defRPr>
-                <a:solidFill>
-                  <a:schemeClr val="tx1"/>
-                </a:solidFill>
-                <a:latin typeface="Arial" charset="0"/>
-              </a:defRPr>
-            </a:lvl9pPr>
-          </a:lstStyle>
-          <a:p>
-            <a:pPr algn="ctr" eaLnBrk="1" hangingPunct="1">
-              <a:spcBef>
-                <a:spcPct val="50000"/>
-              </a:spcBef>
-            </a:pPr>
-            <a:r>
-              <a:rPr lang="en-US" sz="1600" baseline="30000">
-                <a:solidFill>
-                  <a:schemeClr val="bg2"/>
-                </a:solidFill>
-              </a:rPr>
-              <a:t>3 </a:t>
-            </a:r>
-            <a:r>
-              <a:rPr lang="en-US" sz="1600">
-                <a:solidFill>
-                  <a:schemeClr val="bg2"/>
-                </a:solidFill>
-              </a:rPr>
-              <a:t>&lt;insert 3rd affiliation (institute) here&gt;</a:t>
-            </a:r>
-          </a:p>
-          <a:p>
-            <a:pPr algn="ctr" eaLnBrk="1" hangingPunct="1">
-              <a:spcBef>
-                <a:spcPct val="50000"/>
-              </a:spcBef>
-            </a:pPr>
-            <a:r>
-              <a:rPr lang="en-US" sz="1600" b="1">
-                <a:solidFill>
-                  <a:schemeClr val="bg2"/>
-                </a:solidFill>
-              </a:rPr>
-              <a:t>&lt;insert 3rd affiliation </a:t>
-            </a:r>
-            <a:br>
-              <a:rPr lang="en-US" sz="1600" b="1">
-                <a:solidFill>
-                  <a:schemeClr val="bg2"/>
-                </a:solidFill>
-              </a:rPr>
-            </a:br>
-            <a:r>
-              <a:rPr lang="en-US" sz="1600" b="1">
-                <a:solidFill>
-                  <a:schemeClr val="bg2"/>
-                </a:solidFill>
-              </a:rPr>
-              <a:t>(university) here&gt;</a:t>
-            </a:r>
-          </a:p>
-        </p:txBody>
-      </p:sp>
-      <p:sp>
-        <p:nvSpPr>
-          <p:cNvPr id="9222" name="Text Box 6"/>
-          <p:cNvSpPr txBox="1">
-            <a:spLocks noChangeArrowheads="1"/>
-          </p:cNvSpPr>
-          <p:nvPr/>
-        </p:nvSpPr>
-        <p:spPr bwMode="auto">
-          <a:xfrm>
-            <a:off x="4425950" y="5864225"/>
-            <a:ext cx="4176713" cy="947738"/>
-          </a:xfrm>
-          <a:prstGeom prst="rect">
-            <a:avLst/>
-          </a:prstGeom>
-          <a:noFill/>
-          <a:ln>
-            <a:noFill/>
-          </a:ln>
-          <a:extLst>
-            <a:ext uri="{909E8E84-426E-40DD-AFC4-6F175D3DCCD1}">
-              <a14:hiddenFill xmlns:a14="http://schemas.microsoft.com/office/drawing/2010/main">
-                <a:solidFill>
-                  <a:srgbClr val="FFFFFF"/>
-                </a:solidFill>
-              </a14:hiddenFill>
-            </a:ext>
-            <a:ext uri="{91240B29-F687-4F45-9708-019B960494DF}">
-              <a14:hiddenLine xmlns:a14="http://schemas.microsoft.com/office/drawing/2010/main" w="9525">
-                <a:solidFill>
-                  <a:srgbClr val="000000"/>
-                </a:solidFill>
-                <a:miter lim="800000"/>
-                <a:headEnd/>
-                <a:tailEnd/>
-              </a14:hiddenLine>
-            </a:ext>
-          </a:extLst>
-        </p:spPr>
-        <p:txBody>
-          <a:bodyPr>
-            <a:spAutoFit/>
-          </a:bodyPr>
-          <a:lstStyle>
-            <a:lvl1pPr eaLnBrk="0" hangingPunct="0">
-              <a:defRPr>
-                <a:solidFill>
-                  <a:schemeClr val="tx1"/>
-                </a:solidFill>
-                <a:latin typeface="Arial" charset="0"/>
-              </a:defRPr>
-            </a:lvl1pPr>
-            <a:lvl2pPr marL="742950" indent="-285750" eaLnBrk="0" hangingPunct="0">
-              <a:defRPr>
-                <a:solidFill>
-                  <a:schemeClr val="tx1"/>
-                </a:solidFill>
-                <a:latin typeface="Arial" charset="0"/>
-              </a:defRPr>
-            </a:lvl2pPr>
-            <a:lvl3pPr marL="1143000" indent="-228600" eaLnBrk="0" hangingPunct="0">
-              <a:defRPr>
-                <a:solidFill>
-                  <a:schemeClr val="tx1"/>
-                </a:solidFill>
-                <a:latin typeface="Arial" charset="0"/>
-              </a:defRPr>
-            </a:lvl3pPr>
-            <a:lvl4pPr marL="1600200" indent="-228600" eaLnBrk="0" hangingPunct="0">
-              <a:defRPr>
-                <a:solidFill>
-                  <a:schemeClr val="tx1"/>
-                </a:solidFill>
-                <a:latin typeface="Arial" charset="0"/>
-              </a:defRPr>
-            </a:lvl4pPr>
-            <a:lvl5pPr marL="2057400" indent="-228600" eaLnBrk="0" hangingPunct="0">
-              <a:defRPr>
-                <a:solidFill>
-                  <a:schemeClr val="tx1"/>
-                </a:solidFill>
-                <a:latin typeface="Arial" charset="0"/>
-              </a:defRPr>
-            </a:lvl5pPr>
-            <a:lvl6pPr marL="2514600" indent="-228600" eaLnBrk="0" fontAlgn="base" hangingPunct="0">
-              <a:spcBef>
-                <a:spcPct val="0"/>
-              </a:spcBef>
-              <a:spcAft>
-                <a:spcPct val="0"/>
-              </a:spcAft>
-              <a:defRPr>
-                <a:solidFill>
-                  <a:schemeClr val="tx1"/>
-                </a:solidFill>
-                <a:latin typeface="Arial" charset="0"/>
-              </a:defRPr>
-            </a:lvl6pPr>
-            <a:lvl7pPr marL="2971800" indent="-228600" eaLnBrk="0" fontAlgn="base" hangingPunct="0">
-              <a:spcBef>
-                <a:spcPct val="0"/>
-              </a:spcBef>
-              <a:spcAft>
-                <a:spcPct val="0"/>
-              </a:spcAft>
-              <a:defRPr>
-                <a:solidFill>
-                  <a:schemeClr val="tx1"/>
-                </a:solidFill>
-                <a:latin typeface="Arial" charset="0"/>
-              </a:defRPr>
-            </a:lvl7pPr>
-            <a:lvl8pPr marL="3429000" indent="-228600" eaLnBrk="0" fontAlgn="base" hangingPunct="0">
-              <a:spcBef>
-                <a:spcPct val="0"/>
-              </a:spcBef>
-              <a:spcAft>
-                <a:spcPct val="0"/>
-              </a:spcAft>
-              <a:defRPr>
-                <a:solidFill>
-                  <a:schemeClr val="tx1"/>
-                </a:solidFill>
-                <a:latin typeface="Arial" charset="0"/>
-              </a:defRPr>
-            </a:lvl8pPr>
-            <a:lvl9pPr marL="3886200" indent="-228600" eaLnBrk="0" fontAlgn="base" hangingPunct="0">
-              <a:spcBef>
-                <a:spcPct val="0"/>
-              </a:spcBef>
-              <a:spcAft>
-                <a:spcPct val="0"/>
-              </a:spcAft>
-              <a:defRPr>
-                <a:solidFill>
-                  <a:schemeClr val="tx1"/>
-                </a:solidFill>
-                <a:latin typeface="Arial" charset="0"/>
-              </a:defRPr>
-            </a:lvl9pPr>
-          </a:lstStyle>
-          <a:p>
-            <a:pPr algn="ctr" eaLnBrk="1" hangingPunct="1">
-              <a:spcBef>
-                <a:spcPct val="50000"/>
-              </a:spcBef>
-            </a:pPr>
-            <a:r>
-              <a:rPr lang="en-US" sz="1600" baseline="30000">
-                <a:solidFill>
-                  <a:schemeClr val="bg2"/>
-                </a:solidFill>
-              </a:rPr>
-              <a:t>4 </a:t>
-            </a:r>
-            <a:r>
-              <a:rPr lang="en-US" sz="1600">
-                <a:solidFill>
-                  <a:schemeClr val="bg2"/>
-                </a:solidFill>
-              </a:rPr>
-              <a:t>&lt;insert 2nd affiliation (institute) here&gt;</a:t>
-            </a:r>
-          </a:p>
-          <a:p>
-            <a:pPr algn="ctr" eaLnBrk="1" hangingPunct="1">
-              <a:spcBef>
-                <a:spcPct val="50000"/>
-              </a:spcBef>
-            </a:pPr>
-            <a:r>
-              <a:rPr lang="en-US" sz="1600" b="1">
-                <a:solidFill>
-                  <a:schemeClr val="bg2"/>
-                </a:solidFill>
-              </a:rPr>
-              <a:t>&lt;insert 2nd affiliation</a:t>
-            </a:r>
-            <a:br>
-              <a:rPr lang="en-US" sz="1600" b="1">
-                <a:solidFill>
-                  <a:schemeClr val="bg2"/>
-                </a:solidFill>
-              </a:rPr>
-            </a:br>
-            <a:r>
-              <a:rPr lang="en-US" sz="1600" b="1">
-                <a:solidFill>
-                  <a:schemeClr val="bg2"/>
-                </a:solidFill>
-              </a:rPr>
-              <a:t>(university) here&gt;</a:t>
-            </a:r>
-          </a:p>
-        </p:txBody>
-      </p:sp>
-      <p:sp>
-        <p:nvSpPr>
-          <p:cNvPr id="9223" name="Text Box 7"/>
-          <p:cNvSpPr txBox="1">
-            <a:spLocks noChangeArrowheads="1"/>
-          </p:cNvSpPr>
-          <p:nvPr/>
-        </p:nvSpPr>
-        <p:spPr bwMode="auto">
-          <a:xfrm>
-            <a:off x="179388" y="4652963"/>
-            <a:ext cx="4176712" cy="947737"/>
-          </a:xfrm>
-          <a:prstGeom prst="rect">
-            <a:avLst/>
-          </a:prstGeom>
-          <a:noFill/>
-          <a:ln>
-            <a:noFill/>
-          </a:ln>
-          <a:extLst>
-            <a:ext uri="{909E8E84-426E-40DD-AFC4-6F175D3DCCD1}">
-              <a14:hiddenFill xmlns:a14="http://schemas.microsoft.com/office/drawing/2010/main">
-                <a:solidFill>
-                  <a:srgbClr val="FFFFFF"/>
-                </a:solidFill>
-              </a14:hiddenFill>
-            </a:ext>
-            <a:ext uri="{91240B29-F687-4F45-9708-019B960494DF}">
-              <a14:hiddenLine xmlns:a14="http://schemas.microsoft.com/office/drawing/2010/main" w="9525">
-                <a:solidFill>
-                  <a:srgbClr val="000000"/>
-                </a:solidFill>
-                <a:miter lim="800000"/>
-                <a:headEnd/>
-                <a:tailEnd/>
-              </a14:hiddenLine>
-            </a:ext>
-          </a:extLst>
-        </p:spPr>
-        <p:txBody>
-          <a:bodyPr>
-            <a:spAutoFit/>
-          </a:bodyPr>
-          <a:lstStyle>
-            <a:lvl1pPr eaLnBrk="0" hangingPunct="0">
-              <a:defRPr>
-                <a:solidFill>
-                  <a:schemeClr val="tx1"/>
-                </a:solidFill>
-                <a:latin typeface="Arial" charset="0"/>
-              </a:defRPr>
-            </a:lvl1pPr>
-            <a:lvl2pPr marL="742950" indent="-285750" eaLnBrk="0" hangingPunct="0">
-              <a:defRPr>
-                <a:solidFill>
-                  <a:schemeClr val="tx1"/>
-                </a:solidFill>
-                <a:latin typeface="Arial" charset="0"/>
-              </a:defRPr>
-            </a:lvl2pPr>
-            <a:lvl3pPr marL="1143000" indent="-228600" eaLnBrk="0" hangingPunct="0">
-              <a:defRPr>
-                <a:solidFill>
-                  <a:schemeClr val="tx1"/>
-                </a:solidFill>
-                <a:latin typeface="Arial" charset="0"/>
-              </a:defRPr>
-            </a:lvl3pPr>
-            <a:lvl4pPr marL="1600200" indent="-228600" eaLnBrk="0" hangingPunct="0">
-              <a:defRPr>
-                <a:solidFill>
-                  <a:schemeClr val="tx1"/>
-                </a:solidFill>
-                <a:latin typeface="Arial" charset="0"/>
-              </a:defRPr>
-            </a:lvl4pPr>
-            <a:lvl5pPr marL="2057400" indent="-228600" eaLnBrk="0" hangingPunct="0">
-              <a:defRPr>
-                <a:solidFill>
-                  <a:schemeClr val="tx1"/>
-                </a:solidFill>
-                <a:latin typeface="Arial" charset="0"/>
-              </a:defRPr>
-            </a:lvl5pPr>
-            <a:lvl6pPr marL="2514600" indent="-228600" eaLnBrk="0" fontAlgn="base" hangingPunct="0">
-              <a:spcBef>
-                <a:spcPct val="0"/>
-              </a:spcBef>
-              <a:spcAft>
-                <a:spcPct val="0"/>
-              </a:spcAft>
-              <a:defRPr>
-                <a:solidFill>
-                  <a:schemeClr val="tx1"/>
-                </a:solidFill>
-                <a:latin typeface="Arial" charset="0"/>
-              </a:defRPr>
-            </a:lvl6pPr>
-            <a:lvl7pPr marL="2971800" indent="-228600" eaLnBrk="0" fontAlgn="base" hangingPunct="0">
-              <a:spcBef>
-                <a:spcPct val="0"/>
-              </a:spcBef>
-              <a:spcAft>
-                <a:spcPct val="0"/>
-              </a:spcAft>
-              <a:defRPr>
-                <a:solidFill>
-                  <a:schemeClr val="tx1"/>
-                </a:solidFill>
-                <a:latin typeface="Arial" charset="0"/>
-              </a:defRPr>
-            </a:lvl7pPr>
-            <a:lvl8pPr marL="3429000" indent="-228600" eaLnBrk="0" fontAlgn="base" hangingPunct="0">
-              <a:spcBef>
-                <a:spcPct val="0"/>
-              </a:spcBef>
-              <a:spcAft>
-                <a:spcPct val="0"/>
-              </a:spcAft>
-              <a:defRPr>
-                <a:solidFill>
-                  <a:schemeClr val="tx1"/>
-                </a:solidFill>
-                <a:latin typeface="Arial" charset="0"/>
-              </a:defRPr>
-            </a:lvl8pPr>
-            <a:lvl9pPr marL="3886200" indent="-228600" eaLnBrk="0" fontAlgn="base" hangingPunct="0">
-              <a:spcBef>
-                <a:spcPct val="0"/>
-              </a:spcBef>
-              <a:spcAft>
-                <a:spcPct val="0"/>
-              </a:spcAft>
-              <a:defRPr>
-                <a:solidFill>
-                  <a:schemeClr val="tx1"/>
-                </a:solidFill>
-                <a:latin typeface="Arial" charset="0"/>
-              </a:defRPr>
-            </a:lvl9pPr>
-          </a:lstStyle>
-          <a:p>
-            <a:pPr algn="ctr" eaLnBrk="1" hangingPunct="1">
-              <a:spcBef>
-                <a:spcPct val="50000"/>
-              </a:spcBef>
-            </a:pPr>
-            <a:r>
-              <a:rPr lang="en-US" sz="1600" baseline="30000">
-                <a:solidFill>
-                  <a:schemeClr val="bg2"/>
-                </a:solidFill>
-              </a:rPr>
-              <a:t>1</a:t>
-            </a:r>
-            <a:r>
-              <a:rPr lang="en-US" sz="1600">
-                <a:solidFill>
-                  <a:schemeClr val="bg2"/>
-                </a:solidFill>
-              </a:rPr>
-              <a:t> Institute of Computer Graphics</a:t>
-            </a:r>
-            <a:br>
-              <a:rPr lang="en-US" sz="1600">
-                <a:solidFill>
-                  <a:schemeClr val="bg2"/>
-                </a:solidFill>
-              </a:rPr>
-            </a:br>
-            <a:r>
-              <a:rPr lang="en-US" sz="1600">
-                <a:solidFill>
-                  <a:schemeClr val="bg2"/>
-                </a:solidFill>
-              </a:rPr>
-              <a:t>and Algorithms</a:t>
-            </a:r>
-          </a:p>
-          <a:p>
-            <a:pPr algn="ctr" eaLnBrk="1" hangingPunct="1">
-              <a:spcBef>
-                <a:spcPct val="50000"/>
-              </a:spcBef>
-            </a:pPr>
-            <a:r>
-              <a:rPr lang="en-US" sz="1600" b="1">
-                <a:solidFill>
-                  <a:schemeClr val="bg2"/>
-                </a:solidFill>
-              </a:rPr>
-              <a:t>Vienna University of Technology</a:t>
-            </a:r>
-          </a:p>
-        </p:txBody>
-      </p:sp>
-    </p:spTree>
-    <p:extLst>
-      <p:ext uri="{BB962C8B-B14F-4D97-AF65-F5344CB8AC3E}">
-        <p14:creationId xmlns:p14="http://schemas.microsoft.com/office/powerpoint/2010/main" val="3876238281"/>
-      </p:ext>
-    </p:extLst>
-  </p:cSld>
-  <p:clrMapOvr>
-    <a:masterClrMapping/>
-  </p:clrMapOvr>
-  <p:timing>
-    <p:tnLst>
-      <p:par>
-        <p:cTn id="1" dur="indefinite" restart="never" nodeType="tmRoot"/>
-      </p:par>
-    </p:tnLst>
-  </p:timing>
-</p:sld>
-</file>
-
-<file path=ppt/slides/slide8.xml><?xml version="1.0" encoding="utf-8"?>
 <p:sld xmlns:a="http://schemas.openxmlformats.org/drawingml/2006/main" xmlns:r="http://schemas.openxmlformats.org/officeDocument/2006/relationships" xmlns:p="http://schemas.openxmlformats.org/presentationml/2006/main">
   <p:cSld>
     <p:spTree>
@@ -23438,7 +20902,7 @@
         <p:nvPicPr>
           <p:cNvPr id="10246" name="Picture 4" descr="motivation"/>
           <p:cNvPicPr>
-            <a:picLocks noChangeAspect="1" noChangeArrowheads="1"/>
+            <a:picLocks noGrp="1" noChangeAspect="1" noChangeArrowheads="1"/>
           </p:cNvPicPr>
           <p:nvPr>
             <p:ph sz="half" idx="1"/>
@@ -23485,7 +20949,7 @@
             </a:pPr>
             <a:fld id="{63707275-EA33-4C2C-A96C-B80BEB93EE54}" type="slidenum">
               <a:rPr lang="de-AT" smtClean="0"/>
-              <a:t>8</a:t>
+              <a:t>4</a:t>
             </a:fld>
             <a:endParaRPr lang="de-AT" dirty="0"/>
           </a:p>
@@ -23510,8 +20974,8 @@
               <a:defRPr/>
             </a:pPr>
             <a:r>
-              <a:rPr lang="de-AT" smtClean="0"/>
-              <a:t>&lt;insert your name here&gt;</a:t>
+              <a:rPr lang="de-AT" dirty="0"/>
+              <a:t>Bernhard Rainer, Silvester Farda</a:t>
             </a:r>
             <a:endParaRPr lang="de-AT" dirty="0"/>
           </a:p>
@@ -23537,7 +21001,7 @@
 </p:sld>
 </file>
 
-<file path=ppt/slides/slide9.xml><?xml version="1.0" encoding="utf-8"?>
+<file path=ppt/slides/slide5.xml><?xml version="1.0" encoding="utf-8"?>
 <p:sld xmlns:a="http://schemas.openxmlformats.org/drawingml/2006/main" xmlns:r="http://schemas.openxmlformats.org/officeDocument/2006/relationships" xmlns:p="http://schemas.openxmlformats.org/presentationml/2006/main">
   <p:cSld>
     <p:spTree>
@@ -23594,42 +21058,42 @@
           <a:p>
             <a:pPr eaLnBrk="1" hangingPunct="1"/>
             <a:r>
-              <a:rPr lang="en-US" smtClean="0"/>
+              <a:rPr lang="en-US" dirty="0" smtClean="0"/>
               <a:t>The quick brown fox jumps over the lazy dog</a:t>
             </a:r>
           </a:p>
           <a:p>
             <a:pPr lvl="1" eaLnBrk="1" hangingPunct="1"/>
             <a:r>
-              <a:rPr lang="en-US" smtClean="0"/>
+              <a:rPr lang="en-US" dirty="0" smtClean="0"/>
               <a:t>The quick brown fox jumps over the lazy master</a:t>
             </a:r>
           </a:p>
           <a:p>
             <a:pPr lvl="2" eaLnBrk="1" hangingPunct="1"/>
             <a:r>
-              <a:rPr lang="en-US" smtClean="0"/>
+              <a:rPr lang="en-US" dirty="0" smtClean="0"/>
               <a:t>The quick brown fox jumps over the lazy dog</a:t>
             </a:r>
           </a:p>
           <a:p>
             <a:pPr lvl="3" eaLnBrk="1" hangingPunct="1"/>
             <a:r>
-              <a:rPr lang="en-US" smtClean="0"/>
+              <a:rPr lang="en-US" dirty="0" smtClean="0"/>
               <a:t>The quick brown fox jumps over the lazy dog</a:t>
             </a:r>
           </a:p>
           <a:p>
             <a:pPr eaLnBrk="1" hangingPunct="1"/>
             <a:r>
-              <a:rPr lang="en-US" smtClean="0"/>
+              <a:rPr lang="en-US" dirty="0" smtClean="0"/>
               <a:t>The quick brown fox jumps over the lazy master</a:t>
             </a:r>
           </a:p>
           <a:p>
             <a:pPr lvl="1" eaLnBrk="1" hangingPunct="1"/>
             <a:r>
-              <a:rPr lang="en-US" smtClean="0"/>
+              <a:rPr lang="en-US" dirty="0" smtClean="0"/>
               <a:t>The quick brown fox jumps over the lazy dog</a:t>
             </a:r>
           </a:p>
@@ -23655,7 +21119,7 @@
             </a:pPr>
             <a:fld id="{63707275-EA33-4C2C-A96C-B80BEB93EE54}" type="slidenum">
               <a:rPr lang="de-AT" smtClean="0"/>
-              <a:t>9</a:t>
+              <a:t>5</a:t>
             </a:fld>
             <a:endParaRPr lang="de-AT" dirty="0"/>
           </a:p>
@@ -23680,8 +21144,8 @@
               <a:defRPr/>
             </a:pPr>
             <a:r>
-              <a:rPr lang="de-AT" smtClean="0"/>
-              <a:t>&lt;insert your name here&gt;</a:t>
+              <a:rPr lang="de-AT" dirty="0"/>
+              <a:t>Bernhard Rainer, Silvester Farda</a:t>
             </a:r>
             <a:endParaRPr lang="de-AT" dirty="0"/>
           </a:p>
@@ -23691,6 +21155,530 @@
     <p:extLst>
       <p:ext uri="{BB962C8B-B14F-4D97-AF65-F5344CB8AC3E}">
         <p14:creationId xmlns:p14="http://schemas.microsoft.com/office/powerpoint/2010/main" val="3817806692"/>
+      </p:ext>
+    </p:extLst>
+  </p:cSld>
+  <p:clrMapOvr>
+    <a:masterClrMapping/>
+  </p:clrMapOvr>
+  <p:timing>
+    <p:tnLst>
+      <p:par>
+        <p:cTn id="1" dur="indefinite" restart="never" nodeType="tmRoot"/>
+      </p:par>
+    </p:tnLst>
+  </p:timing>
+</p:sld>
+</file>
+
+<file path=ppt/slides/slide6.xml><?xml version="1.0" encoding="utf-8"?>
+<p:sld xmlns:a="http://schemas.openxmlformats.org/drawingml/2006/main" xmlns:r="http://schemas.openxmlformats.org/officeDocument/2006/relationships" xmlns:p="http://schemas.openxmlformats.org/presentationml/2006/main">
+  <p:cSld>
+    <p:spTree>
+      <p:nvGrpSpPr>
+        <p:cNvPr id="1" name=""/>
+        <p:cNvGrpSpPr/>
+        <p:nvPr/>
+      </p:nvGrpSpPr>
+      <p:grpSpPr>
+        <a:xfrm>
+          <a:off x="0" y="0"/>
+          <a:ext cx="0" cy="0"/>
+          <a:chOff x="0" y="0"/>
+          <a:chExt cx="0" cy="0"/>
+        </a:xfrm>
+      </p:grpSpPr>
+      <p:sp>
+        <p:nvSpPr>
+          <p:cNvPr id="12292" name="Rectangle 2"/>
+          <p:cNvSpPr>
+            <a:spLocks noGrp="1" noChangeArrowheads="1"/>
+          </p:cNvSpPr>
+          <p:nvPr>
+            <p:ph type="title"/>
+          </p:nvPr>
+        </p:nvSpPr>
+        <p:spPr/>
+        <p:txBody>
+          <a:bodyPr/>
+          <a:lstStyle/>
+          <a:p>
+            <a:pPr eaLnBrk="1" hangingPunct="1"/>
+            <a:r>
+              <a:rPr lang="en-US" smtClean="0"/>
+              <a:t>Conclusions</a:t>
+            </a:r>
+          </a:p>
+        </p:txBody>
+      </p:sp>
+      <p:sp>
+        <p:nvSpPr>
+          <p:cNvPr id="12293" name="Rectangle 3"/>
+          <p:cNvSpPr>
+            <a:spLocks noGrp="1" noChangeArrowheads="1"/>
+          </p:cNvSpPr>
+          <p:nvPr>
+            <p:ph type="body" idx="1"/>
+          </p:nvPr>
+        </p:nvSpPr>
+        <p:spPr/>
+        <p:txBody>
+          <a:bodyPr/>
+          <a:lstStyle/>
+          <a:p>
+            <a:pPr eaLnBrk="1" hangingPunct="1"/>
+            <a:r>
+              <a:rPr lang="en-US" dirty="0" smtClean="0"/>
+              <a:t>The quick brown fox jumps over the lazy dog</a:t>
+            </a:r>
+          </a:p>
+          <a:p>
+            <a:pPr eaLnBrk="1" hangingPunct="1"/>
+            <a:r>
+              <a:rPr lang="en-US" dirty="0" smtClean="0"/>
+              <a:t>The quick brown master jumps over the lazy dog</a:t>
+            </a:r>
+          </a:p>
+          <a:p>
+            <a:pPr eaLnBrk="1" hangingPunct="1"/>
+            <a:r>
+              <a:rPr lang="en-US" dirty="0" smtClean="0"/>
+              <a:t>The quick brown fox jumps over the lazy dog</a:t>
+            </a:r>
+          </a:p>
+          <a:p>
+            <a:pPr eaLnBrk="1" hangingPunct="1"/>
+            <a:r>
+              <a:rPr lang="en-US" dirty="0" smtClean="0"/>
+              <a:t>The quick brown master jumps over the lazy dog</a:t>
+            </a:r>
+          </a:p>
+          <a:p>
+            <a:pPr eaLnBrk="1" hangingPunct="1"/>
+            <a:r>
+              <a:rPr lang="en-US" dirty="0" smtClean="0"/>
+              <a:t>The quick brown fox jumps over the lazy dog</a:t>
+            </a:r>
+          </a:p>
+        </p:txBody>
+      </p:sp>
+      <p:sp>
+        <p:nvSpPr>
+          <p:cNvPr id="5" name="Slide Number Placeholder 4"/>
+          <p:cNvSpPr>
+            <a:spLocks noGrp="1"/>
+          </p:cNvSpPr>
+          <p:nvPr>
+            <p:ph type="sldNum" sz="quarter" idx="11"/>
+          </p:nvPr>
+        </p:nvSpPr>
+        <p:spPr/>
+        <p:txBody>
+          <a:bodyPr/>
+          <a:lstStyle/>
+          <a:p>
+            <a:pPr>
+              <a:defRPr/>
+            </a:pPr>
+            <a:fld id="{63707275-EA33-4C2C-A96C-B80BEB93EE54}" type="slidenum">
+              <a:rPr lang="de-AT" smtClean="0"/>
+              <a:t>6</a:t>
+            </a:fld>
+            <a:endParaRPr lang="de-AT" dirty="0"/>
+          </a:p>
+        </p:txBody>
+      </p:sp>
+      <p:sp>
+        <p:nvSpPr>
+          <p:cNvPr id="6" name="Footer Placeholder 5"/>
+          <p:cNvSpPr>
+            <a:spLocks noGrp="1"/>
+          </p:cNvSpPr>
+          <p:nvPr>
+            <p:ph type="ftr" sz="quarter" idx="10"/>
+          </p:nvPr>
+        </p:nvSpPr>
+        <p:spPr/>
+        <p:txBody>
+          <a:bodyPr/>
+          <a:lstStyle/>
+          <a:p>
+            <a:pPr>
+              <a:defRPr/>
+            </a:pPr>
+            <a:r>
+              <a:rPr lang="de-AT" dirty="0"/>
+              <a:t>Bernhard Rainer, Silvester Farda</a:t>
+            </a:r>
+            <a:endParaRPr lang="de-AT" dirty="0"/>
+          </a:p>
+        </p:txBody>
+      </p:sp>
+    </p:spTree>
+    <p:extLst>
+      <p:ext uri="{BB962C8B-B14F-4D97-AF65-F5344CB8AC3E}">
+        <p14:creationId xmlns:p14="http://schemas.microsoft.com/office/powerpoint/2010/main" val="1565256185"/>
+      </p:ext>
+    </p:extLst>
+  </p:cSld>
+  <p:clrMapOvr>
+    <a:masterClrMapping/>
+  </p:clrMapOvr>
+  <p:timing>
+    <p:tnLst>
+      <p:par>
+        <p:cTn id="1" dur="indefinite" restart="never" nodeType="tmRoot"/>
+      </p:par>
+    </p:tnLst>
+  </p:timing>
+</p:sld>
+</file>
+
+<file path=ppt/slides/slide7.xml><?xml version="1.0" encoding="utf-8"?>
+<p:sld xmlns:a="http://schemas.openxmlformats.org/drawingml/2006/main" xmlns:r="http://schemas.openxmlformats.org/officeDocument/2006/relationships" xmlns:p="http://schemas.openxmlformats.org/presentationml/2006/main">
+  <p:cSld>
+    <p:spTree>
+      <p:nvGrpSpPr>
+        <p:cNvPr id="1" name=""/>
+        <p:cNvGrpSpPr/>
+        <p:nvPr/>
+      </p:nvGrpSpPr>
+      <p:grpSpPr>
+        <a:xfrm>
+          <a:off x="0" y="0"/>
+          <a:ext cx="0" cy="0"/>
+          <a:chOff x="0" y="0"/>
+          <a:chExt cx="0" cy="0"/>
+        </a:xfrm>
+      </p:grpSpPr>
+      <p:sp>
+        <p:nvSpPr>
+          <p:cNvPr id="7170" name="Rectangle 2"/>
+          <p:cNvSpPr>
+            <a:spLocks noGrp="1" noChangeArrowheads="1"/>
+          </p:cNvSpPr>
+          <p:nvPr>
+            <p:ph type="ctrTitle"/>
+          </p:nvPr>
+        </p:nvSpPr>
+        <p:spPr/>
+        <p:txBody>
+          <a:bodyPr/>
+          <a:lstStyle/>
+          <a:p>
+            <a:pPr eaLnBrk="1" hangingPunct="1"/>
+            <a:r>
+              <a:rPr lang="en-US" dirty="0" smtClean="0"/>
+              <a:t>Procedural </a:t>
+            </a:r>
+            <a:r>
+              <a:rPr lang="en-US" dirty="0"/>
+              <a:t>modelling of complex </a:t>
+            </a:r>
+            <a:r>
+              <a:rPr lang="en-US" dirty="0" smtClean="0"/>
+              <a:t>systems</a:t>
+            </a:r>
+            <a:endParaRPr lang="en-US" dirty="0" smtClean="0"/>
+          </a:p>
+        </p:txBody>
+      </p:sp>
+      <p:sp>
+        <p:nvSpPr>
+          <p:cNvPr id="7171" name="Rectangle 3"/>
+          <p:cNvSpPr>
+            <a:spLocks noGrp="1" noChangeArrowheads="1"/>
+          </p:cNvSpPr>
+          <p:nvPr>
+            <p:ph type="subTitle" idx="1"/>
+          </p:nvPr>
+        </p:nvSpPr>
+        <p:spPr/>
+        <p:txBody>
+          <a:bodyPr/>
+          <a:lstStyle/>
+          <a:p>
+            <a:pPr eaLnBrk="1" hangingPunct="1"/>
+            <a:r>
+              <a:rPr lang="en-US" dirty="0"/>
+              <a:t>Bernhard </a:t>
+            </a:r>
+            <a:r>
+              <a:rPr lang="en-US" dirty="0" smtClean="0"/>
+              <a:t>Rainer</a:t>
+            </a:r>
+            <a:r>
+              <a:rPr lang="en-US" baseline="30000" dirty="0" smtClean="0"/>
+              <a:t>1</a:t>
+            </a:r>
+            <a:r>
+              <a:rPr lang="en-US" dirty="0" smtClean="0"/>
+              <a:t> </a:t>
+            </a:r>
+            <a:r>
+              <a:rPr lang="en-US" dirty="0" smtClean="0"/>
+              <a:t>and </a:t>
+            </a:r>
+            <a:r>
+              <a:rPr lang="en-US" dirty="0" smtClean="0"/>
+              <a:t>Silvester Farda</a:t>
+            </a:r>
+            <a:r>
+              <a:rPr lang="en-US" baseline="30000" dirty="0" smtClean="0"/>
+              <a:t>1</a:t>
+            </a:r>
+            <a:endParaRPr lang="en-US" baseline="30000" dirty="0" smtClean="0"/>
+          </a:p>
+        </p:txBody>
+      </p:sp>
+      <p:sp>
+        <p:nvSpPr>
+          <p:cNvPr id="6" name="Rectangle 3"/>
+          <p:cNvSpPr txBox="1">
+            <a:spLocks noChangeArrowheads="1"/>
+          </p:cNvSpPr>
+          <p:nvPr/>
+        </p:nvSpPr>
+        <p:spPr bwMode="auto">
+          <a:xfrm>
+            <a:off x="345812" y="4725144"/>
+            <a:ext cx="8424862" cy="1439863"/>
+          </a:xfrm>
+          <a:prstGeom prst="rect">
+            <a:avLst/>
+          </a:prstGeom>
+          <a:noFill/>
+          <a:ln w="9525">
+            <a:noFill/>
+            <a:miter lim="800000"/>
+            <a:headEnd/>
+            <a:tailEnd/>
+          </a:ln>
+        </p:spPr>
+        <p:txBody>
+          <a:bodyPr vert="horz" wrap="square" lIns="91440" tIns="45720" rIns="91440" bIns="45720" numCol="1" anchor="ctr" anchorCtr="0" compatLnSpc="1">
+            <a:prstTxWarp prst="textNoShape">
+              <a:avLst/>
+            </a:prstTxWarp>
+          </a:bodyPr>
+          <a:lstStyle>
+            <a:lvl1pPr marL="0" indent="0" algn="ctr" rtl="0" eaLnBrk="0" fontAlgn="base" hangingPunct="0">
+              <a:spcBef>
+                <a:spcPct val="20000"/>
+              </a:spcBef>
+              <a:spcAft>
+                <a:spcPct val="0"/>
+              </a:spcAft>
+              <a:buClr>
+                <a:srgbClr val="2AA3D8"/>
+              </a:buClr>
+              <a:buSzPct val="65000"/>
+              <a:buFont typeface="Arial" charset="0"/>
+              <a:buNone/>
+              <a:defRPr sz="3600">
+                <a:solidFill>
+                  <a:schemeClr val="tx1"/>
+                </a:solidFill>
+                <a:latin typeface="+mn-lt"/>
+                <a:ea typeface="+mn-ea"/>
+                <a:cs typeface="+mn-cs"/>
+              </a:defRPr>
+            </a:lvl1pPr>
+            <a:lvl2pPr marL="900113" indent="-360363" algn="l" rtl="0" eaLnBrk="0" fontAlgn="base" hangingPunct="0">
+              <a:spcBef>
+                <a:spcPct val="20000"/>
+              </a:spcBef>
+              <a:spcAft>
+                <a:spcPct val="0"/>
+              </a:spcAft>
+              <a:buClr>
+                <a:srgbClr val="2AA3D8"/>
+              </a:buClr>
+              <a:buSzPct val="65000"/>
+              <a:buFont typeface="Arial" charset="0"/>
+              <a:buBlip>
+                <a:blip r:embed="rId2"/>
+              </a:buBlip>
+              <a:defRPr sz="3000">
+                <a:solidFill>
+                  <a:schemeClr val="tx1"/>
+                </a:solidFill>
+                <a:latin typeface="+mn-lt"/>
+              </a:defRPr>
+            </a:lvl2pPr>
+            <a:lvl3pPr marL="1346200" indent="-266700" algn="l" rtl="0" eaLnBrk="0" fontAlgn="base" hangingPunct="0">
+              <a:spcBef>
+                <a:spcPct val="20000"/>
+              </a:spcBef>
+              <a:spcAft>
+                <a:spcPct val="0"/>
+              </a:spcAft>
+              <a:buClr>
+                <a:srgbClr val="2AA3D8"/>
+              </a:buClr>
+              <a:buSzPct val="65000"/>
+              <a:buFont typeface="Arial" charset="0"/>
+              <a:buBlip>
+                <a:blip r:embed="rId2"/>
+              </a:buBlip>
+              <a:defRPr sz="2800">
+                <a:solidFill>
+                  <a:schemeClr val="tx1"/>
+                </a:solidFill>
+                <a:latin typeface="+mn-lt"/>
+              </a:defRPr>
+            </a:lvl3pPr>
+            <a:lvl4pPr marL="1792288" indent="-266700" algn="l" rtl="0" eaLnBrk="0" fontAlgn="base" hangingPunct="0">
+              <a:spcBef>
+                <a:spcPct val="20000"/>
+              </a:spcBef>
+              <a:spcAft>
+                <a:spcPct val="0"/>
+              </a:spcAft>
+              <a:buClr>
+                <a:srgbClr val="2AA3D8"/>
+              </a:buClr>
+              <a:buSzPct val="65000"/>
+              <a:buFont typeface="Arial" charset="0"/>
+              <a:buBlip>
+                <a:blip r:embed="rId2"/>
+              </a:buBlip>
+              <a:defRPr sz="2600">
+                <a:solidFill>
+                  <a:schemeClr val="tx1"/>
+                </a:solidFill>
+                <a:latin typeface="+mn-lt"/>
+              </a:defRPr>
+            </a:lvl4pPr>
+            <a:lvl5pPr marL="2239963" indent="-268288" algn="l" rtl="0" eaLnBrk="0" fontAlgn="base" hangingPunct="0">
+              <a:spcBef>
+                <a:spcPct val="20000"/>
+              </a:spcBef>
+              <a:spcAft>
+                <a:spcPct val="0"/>
+              </a:spcAft>
+              <a:buClr>
+                <a:srgbClr val="2AA3D8"/>
+              </a:buClr>
+              <a:buSzPct val="65000"/>
+              <a:buFont typeface="Arial" charset="0"/>
+              <a:buBlip>
+                <a:blip r:embed="rId2"/>
+              </a:buBlip>
+              <a:defRPr sz="2400">
+                <a:solidFill>
+                  <a:schemeClr val="tx1"/>
+                </a:solidFill>
+                <a:latin typeface="+mn-lt"/>
+              </a:defRPr>
+            </a:lvl5pPr>
+            <a:lvl6pPr marL="2697163" indent="-268288" algn="l" rtl="0" fontAlgn="base">
+              <a:spcBef>
+                <a:spcPct val="20000"/>
+              </a:spcBef>
+              <a:spcAft>
+                <a:spcPct val="0"/>
+              </a:spcAft>
+              <a:buClr>
+                <a:srgbClr val="2AA3D8"/>
+              </a:buClr>
+              <a:buSzPct val="65000"/>
+              <a:buFont typeface="Arial" charset="0"/>
+              <a:buBlip>
+                <a:blip r:embed="rId2"/>
+              </a:buBlip>
+              <a:defRPr sz="2400">
+                <a:solidFill>
+                  <a:schemeClr val="tx1"/>
+                </a:solidFill>
+                <a:latin typeface="+mn-lt"/>
+              </a:defRPr>
+            </a:lvl6pPr>
+            <a:lvl7pPr marL="3154363" indent="-268288" algn="l" rtl="0" fontAlgn="base">
+              <a:spcBef>
+                <a:spcPct val="20000"/>
+              </a:spcBef>
+              <a:spcAft>
+                <a:spcPct val="0"/>
+              </a:spcAft>
+              <a:buClr>
+                <a:srgbClr val="2AA3D8"/>
+              </a:buClr>
+              <a:buSzPct val="65000"/>
+              <a:buFont typeface="Arial" charset="0"/>
+              <a:buBlip>
+                <a:blip r:embed="rId2"/>
+              </a:buBlip>
+              <a:defRPr sz="2400">
+                <a:solidFill>
+                  <a:schemeClr val="tx1"/>
+                </a:solidFill>
+                <a:latin typeface="+mn-lt"/>
+              </a:defRPr>
+            </a:lvl7pPr>
+            <a:lvl8pPr marL="3611563" indent="-268288" algn="l" rtl="0" fontAlgn="base">
+              <a:spcBef>
+                <a:spcPct val="20000"/>
+              </a:spcBef>
+              <a:spcAft>
+                <a:spcPct val="0"/>
+              </a:spcAft>
+              <a:buClr>
+                <a:srgbClr val="2AA3D8"/>
+              </a:buClr>
+              <a:buSzPct val="65000"/>
+              <a:buFont typeface="Arial" charset="0"/>
+              <a:buBlip>
+                <a:blip r:embed="rId2"/>
+              </a:buBlip>
+              <a:defRPr sz="2400">
+                <a:solidFill>
+                  <a:schemeClr val="tx1"/>
+                </a:solidFill>
+                <a:latin typeface="+mn-lt"/>
+              </a:defRPr>
+            </a:lvl8pPr>
+            <a:lvl9pPr marL="4068763" indent="-268288" algn="l" rtl="0" fontAlgn="base">
+              <a:spcBef>
+                <a:spcPct val="20000"/>
+              </a:spcBef>
+              <a:spcAft>
+                <a:spcPct val="0"/>
+              </a:spcAft>
+              <a:buClr>
+                <a:srgbClr val="2AA3D8"/>
+              </a:buClr>
+              <a:buSzPct val="65000"/>
+              <a:buFont typeface="Arial" charset="0"/>
+              <a:buBlip>
+                <a:blip r:embed="rId2"/>
+              </a:buBlip>
+              <a:defRPr sz="2400">
+                <a:solidFill>
+                  <a:schemeClr val="tx1"/>
+                </a:solidFill>
+                <a:latin typeface="+mn-lt"/>
+              </a:defRPr>
+            </a:lvl9pPr>
+          </a:lstStyle>
+          <a:p>
+            <a:pPr eaLnBrk="1" hangingPunct="1"/>
+            <a:r>
+              <a:rPr lang="en-US" sz="3200" kern="0" baseline="30000" dirty="0" smtClean="0"/>
+              <a:t>1</a:t>
+            </a:r>
+            <a:r>
+              <a:rPr lang="en-US" sz="3200" kern="0" dirty="0" smtClean="0"/>
+              <a:t>TU Wien, Austria</a:t>
+            </a:r>
+            <a:endParaRPr lang="en-US" sz="3200" kern="0" baseline="30000" dirty="0" smtClean="0"/>
+          </a:p>
+        </p:txBody>
+      </p:sp>
+    </p:spTree>
+    <p:extLst>
+      <p:ext uri="{BB962C8B-B14F-4D97-AF65-F5344CB8AC3E}">
+        <p14:creationId xmlns:p14="http://schemas.microsoft.com/office/powerpoint/2010/main" val="2231343568"/>
       </p:ext>
     </p:extLst>
   </p:cSld>

</xml_diff>